<commit_message>
Add Code, Modify Presentation
</commit_message>
<xml_diff>
--- a/Presentation/Multitask, Async and Parallel in C#.pptx
+++ b/Presentation/Multitask, Async and Parallel in C#.pptx
@@ -5,10 +5,10 @@
     <p:sldMasterId id="2147483648" r:id="rId4"/>
   </p:sldMasterIdLst>
   <p:notesMasterIdLst>
-    <p:notesMasterId r:id="rId12"/>
+    <p:notesMasterId r:id="rId15"/>
   </p:notesMasterIdLst>
   <p:handoutMasterIdLst>
-    <p:handoutMasterId r:id="rId13"/>
+    <p:handoutMasterId r:id="rId16"/>
   </p:handoutMasterIdLst>
   <p:sldIdLst>
     <p:sldId id="256" r:id="rId5"/>
@@ -17,7 +17,10 @@
     <p:sldId id="270" r:id="rId8"/>
     <p:sldId id="272" r:id="rId9"/>
     <p:sldId id="271" r:id="rId10"/>
-    <p:sldId id="267" r:id="rId11"/>
+    <p:sldId id="273" r:id="rId11"/>
+    <p:sldId id="274" r:id="rId12"/>
+    <p:sldId id="267" r:id="rId13"/>
+    <p:sldId id="275" r:id="rId14"/>
   </p:sldIdLst>
   <p:sldSz cx="12192000" cy="6858000"/>
   <p:notesSz cx="6858000" cy="9144000"/>
@@ -915,7 +918,7 @@
             <a:pPr rtl="0"/>
             <a:fld id="{EE000EEB-8338-48D7-8EE8-EE0082EF7602}" type="slidenum">
               <a:rPr lang="es-ES" smtClean="0"/>
-              <a:t>7</a:t>
+              <a:t>9</a:t>
             </a:fld>
             <a:endParaRPr lang="es-ES"/>
           </a:p>
@@ -7034,6 +7037,93 @@
 </p:sld>
 </file>
 
+<file path=ppt/slides/slide10.xml><?xml version="1.0" encoding="utf-8"?>
+<p:sld xmlns:a="http://schemas.openxmlformats.org/drawingml/2006/main" xmlns:r="http://schemas.openxmlformats.org/officeDocument/2006/relationships" xmlns:p="http://schemas.openxmlformats.org/presentationml/2006/main">
+  <p:cSld>
+    <p:spTree>
+      <p:nvGrpSpPr>
+        <p:cNvPr id="1" name=""/>
+        <p:cNvGrpSpPr/>
+        <p:nvPr/>
+      </p:nvGrpSpPr>
+      <p:grpSpPr>
+        <a:xfrm>
+          <a:off x="0" y="0"/>
+          <a:ext cx="0" cy="0"/>
+          <a:chOff x="0" y="0"/>
+          <a:chExt cx="0" cy="0"/>
+        </a:xfrm>
+      </p:grpSpPr>
+      <p:sp>
+        <p:nvSpPr>
+          <p:cNvPr id="2" name="Título 1">
+            <a:extLst>
+              <a:ext uri="{FF2B5EF4-FFF2-40B4-BE49-F238E27FC236}">
+                <a16:creationId xmlns:a16="http://schemas.microsoft.com/office/drawing/2014/main" id="{96B4C46F-1726-872F-0A81-A010DB66C17A}"/>
+              </a:ext>
+            </a:extLst>
+          </p:cNvPr>
+          <p:cNvSpPr>
+            <a:spLocks noGrp="1"/>
+          </p:cNvSpPr>
+          <p:nvPr>
+            <p:ph type="ctrTitle"/>
+          </p:nvPr>
+        </p:nvSpPr>
+        <p:spPr/>
+        <p:txBody>
+          <a:bodyPr/>
+          <a:lstStyle/>
+          <a:p>
+            <a:r>
+              <a:rPr lang="es-MX" dirty="0" err="1"/>
+              <a:t>Questions</a:t>
+            </a:r>
+            <a:r>
+              <a:rPr lang="es-MX" dirty="0"/>
+              <a:t>?</a:t>
+            </a:r>
+          </a:p>
+        </p:txBody>
+      </p:sp>
+      <p:sp>
+        <p:nvSpPr>
+          <p:cNvPr id="3" name="Subtítulo 2">
+            <a:extLst>
+              <a:ext uri="{FF2B5EF4-FFF2-40B4-BE49-F238E27FC236}">
+                <a16:creationId xmlns:a16="http://schemas.microsoft.com/office/drawing/2014/main" id="{8AD2D9DC-7BDC-2AA1-C359-F61BDC156A1F}"/>
+              </a:ext>
+            </a:extLst>
+          </p:cNvPr>
+          <p:cNvSpPr>
+            <a:spLocks noGrp="1"/>
+          </p:cNvSpPr>
+          <p:nvPr>
+            <p:ph type="subTitle" idx="1"/>
+          </p:nvPr>
+        </p:nvSpPr>
+        <p:spPr/>
+        <p:txBody>
+          <a:bodyPr/>
+          <a:lstStyle/>
+          <a:p>
+            <a:endParaRPr lang="es-MX" dirty="0"/>
+          </a:p>
+        </p:txBody>
+      </p:sp>
+    </p:spTree>
+    <p:extLst>
+      <p:ext uri="{BB962C8B-B14F-4D97-AF65-F5344CB8AC3E}">
+        <p14:creationId xmlns:p14="http://schemas.microsoft.com/office/powerpoint/2010/main" val="4191166655"/>
+      </p:ext>
+    </p:extLst>
+  </p:cSld>
+  <p:clrMapOvr>
+    <a:masterClrMapping/>
+  </p:clrMapOvr>
+</p:sld>
+</file>
+
 <file path=ppt/slides/slide2.xml><?xml version="1.0" encoding="utf-8"?>
 <p:sld xmlns:a="http://schemas.openxmlformats.org/drawingml/2006/main" xmlns:r="http://schemas.openxmlformats.org/officeDocument/2006/relationships" xmlns:p="http://schemas.openxmlformats.org/presentationml/2006/main">
   <p:cSld>
@@ -7101,7 +7191,9 @@
         </p:nvSpPr>
         <p:spPr/>
         <p:txBody>
-          <a:bodyPr/>
+          <a:bodyPr>
+            <a:normAutofit lnSpcReduction="10000"/>
+          </a:bodyPr>
           <a:lstStyle/>
           <a:p>
             <a:r>
@@ -7275,6 +7367,25 @@
             <a:r>
               <a:rPr lang="es-MX" dirty="0" err="1"/>
               <a:t>Workplace</a:t>
+            </a:r>
+            <a:endParaRPr lang="es-MX" dirty="0"/>
+          </a:p>
+          <a:p>
+            <a:r>
+              <a:rPr lang="es-MX" dirty="0"/>
+              <a:t>Data </a:t>
+            </a:r>
+            <a:r>
+              <a:rPr lang="es-MX" dirty="0" err="1"/>
+              <a:t>scientist</a:t>
+            </a:r>
+            <a:r>
+              <a:rPr lang="es-MX" dirty="0"/>
+              <a:t> </a:t>
+            </a:r>
+            <a:r>
+              <a:rPr lang="es-MX" dirty="0" err="1"/>
+              <a:t>newbie</a:t>
             </a:r>
             <a:endParaRPr lang="es-MX" dirty="0"/>
           </a:p>
@@ -7412,6 +7523,25 @@
           </a:p>
           <a:p>
             <a:r>
+              <a:rPr lang="es-MX" dirty="0"/>
+              <a:t>C# </a:t>
+            </a:r>
+            <a:r>
+              <a:rPr lang="es-MX" dirty="0" err="1"/>
+              <a:t>Implementation</a:t>
+            </a:r>
+            <a:r>
+              <a:rPr lang="es-MX" dirty="0"/>
+              <a:t> </a:t>
+            </a:r>
+            <a:r>
+              <a:rPr lang="es-MX" dirty="0" err="1"/>
+              <a:t>options</a:t>
+            </a:r>
+            <a:endParaRPr lang="es-MX" dirty="0"/>
+          </a:p>
+          <a:p>
+            <a:r>
               <a:rPr lang="es-MX" dirty="0" err="1"/>
               <a:t>Measuring</a:t>
             </a:r>
@@ -7419,25 +7549,6 @@
               <a:rPr lang="es-MX" dirty="0"/>
               <a:t> Performance</a:t>
             </a:r>
-          </a:p>
-          <a:p>
-            <a:r>
-              <a:rPr lang="es-MX" dirty="0"/>
-              <a:t>C# </a:t>
-            </a:r>
-            <a:r>
-              <a:rPr lang="es-MX" dirty="0" err="1"/>
-              <a:t>Implementation</a:t>
-            </a:r>
-            <a:r>
-              <a:rPr lang="es-MX" dirty="0"/>
-              <a:t> </a:t>
-            </a:r>
-            <a:r>
-              <a:rPr lang="es-MX" dirty="0" err="1"/>
-              <a:t>options</a:t>
-            </a:r>
-            <a:endParaRPr lang="es-MX" dirty="0"/>
           </a:p>
           <a:p>
             <a:r>
@@ -7955,14 +8066,7 @@
             </a:r>
             <a:r>
               <a:rPr lang="en-US" dirty="0"/>
-              <a:t>A long-running operation might involve tasks that don’t require processor time. it doesn’t make sense to have a program burn CPU cycles waiting for the operation to complete</a:t>
-            </a:r>
-            <a:br>
-              <a:rPr lang="en-US" dirty="0"/>
-            </a:br>
-            <a:r>
-              <a:rPr lang="en-US" dirty="0"/>
-              <a:t>when the program could be doing something more useful instead, such as responding to user input. </a:t>
+              <a:t>A long-running operation might involve tasks that don’t require processor time. it doesn’t make sense to have a program burn CPU cycles waiting for the operation to complete when the program could be doing something more useful instead, such as responding to user input. </a:t>
             </a:r>
             <a:br>
               <a:rPr lang="en-US" dirty="0"/>
@@ -8005,6 +8109,272 @@
 </file>
 
 <file path=ppt/slides/slide7.xml><?xml version="1.0" encoding="utf-8"?>
+<p:sld xmlns:a="http://schemas.openxmlformats.org/drawingml/2006/main" xmlns:r="http://schemas.openxmlformats.org/officeDocument/2006/relationships" xmlns:p="http://schemas.openxmlformats.org/presentationml/2006/main">
+  <p:cSld>
+    <p:spTree>
+      <p:nvGrpSpPr>
+        <p:cNvPr id="1" name=""/>
+        <p:cNvGrpSpPr/>
+        <p:nvPr/>
+      </p:nvGrpSpPr>
+      <p:grpSpPr>
+        <a:xfrm>
+          <a:off x="0" y="0"/>
+          <a:ext cx="0" cy="0"/>
+          <a:chOff x="0" y="0"/>
+          <a:chExt cx="0" cy="0"/>
+        </a:xfrm>
+      </p:grpSpPr>
+      <p:sp>
+        <p:nvSpPr>
+          <p:cNvPr id="2" name="Título 1">
+            <a:extLst>
+              <a:ext uri="{FF2B5EF4-FFF2-40B4-BE49-F238E27FC236}">
+                <a16:creationId xmlns:a16="http://schemas.microsoft.com/office/drawing/2014/main" id="{039A9E4D-7889-3490-92D8-D7D1CB98F7F3}"/>
+              </a:ext>
+            </a:extLst>
+          </p:cNvPr>
+          <p:cNvSpPr>
+            <a:spLocks noGrp="1"/>
+          </p:cNvSpPr>
+          <p:nvPr>
+            <p:ph type="title"/>
+          </p:nvPr>
+        </p:nvSpPr>
+        <p:spPr/>
+        <p:txBody>
+          <a:bodyPr/>
+          <a:lstStyle/>
+          <a:p>
+            <a:r>
+              <a:rPr lang="es-MX" dirty="0"/>
+              <a:t>C# </a:t>
+            </a:r>
+            <a:r>
+              <a:rPr lang="es-MX" dirty="0" err="1"/>
+              <a:t>Implementation</a:t>
+            </a:r>
+            <a:r>
+              <a:rPr lang="es-MX" dirty="0"/>
+              <a:t> </a:t>
+            </a:r>
+            <a:r>
+              <a:rPr lang="es-MX" dirty="0" err="1"/>
+              <a:t>Options</a:t>
+            </a:r>
+            <a:endParaRPr lang="es-MX" dirty="0"/>
+          </a:p>
+        </p:txBody>
+      </p:sp>
+      <p:sp>
+        <p:nvSpPr>
+          <p:cNvPr id="3" name="Marcador de contenido 2">
+            <a:extLst>
+              <a:ext uri="{FF2B5EF4-FFF2-40B4-BE49-F238E27FC236}">
+                <a16:creationId xmlns:a16="http://schemas.microsoft.com/office/drawing/2014/main" id="{51C96787-3C54-0E42-4F41-C2125EE9B2F3}"/>
+              </a:ext>
+            </a:extLst>
+          </p:cNvPr>
+          <p:cNvSpPr>
+            <a:spLocks noGrp="1"/>
+          </p:cNvSpPr>
+          <p:nvPr>
+            <p:ph idx="1"/>
+          </p:nvPr>
+        </p:nvSpPr>
+        <p:spPr/>
+        <p:txBody>
+          <a:bodyPr/>
+          <a:lstStyle/>
+          <a:p>
+            <a:r>
+              <a:rPr lang="es-MX" dirty="0" err="1"/>
+              <a:t>Thread</a:t>
+            </a:r>
+            <a:r>
+              <a:rPr lang="es-MX" dirty="0"/>
+              <a:t>, </a:t>
+            </a:r>
+            <a:r>
+              <a:rPr lang="es-MX" dirty="0" err="1"/>
+              <a:t>ThreadPool</a:t>
+            </a:r>
+            <a:endParaRPr lang="es-MX" dirty="0"/>
+          </a:p>
+          <a:p>
+            <a:r>
+              <a:rPr lang="es-MX" dirty="0" err="1"/>
+              <a:t>Dispatcher</a:t>
+            </a:r>
+            <a:r>
+              <a:rPr lang="es-MX" dirty="0"/>
+              <a:t>, </a:t>
+            </a:r>
+            <a:r>
+              <a:rPr lang="es-MX" dirty="0" err="1"/>
+              <a:t>Backgroundworker</a:t>
+            </a:r>
+            <a:endParaRPr lang="es-MX" dirty="0"/>
+          </a:p>
+          <a:p>
+            <a:r>
+              <a:rPr lang="es-MX" dirty="0" err="1"/>
+              <a:t>Task</a:t>
+            </a:r>
+            <a:r>
+              <a:rPr lang="es-MX" dirty="0"/>
+              <a:t> (TPL)</a:t>
+            </a:r>
+          </a:p>
+          <a:p>
+            <a:r>
+              <a:rPr lang="es-MX" dirty="0" err="1"/>
+              <a:t>Async</a:t>
+            </a:r>
+            <a:r>
+              <a:rPr lang="es-MX" dirty="0"/>
+              <a:t> </a:t>
+            </a:r>
+            <a:r>
+              <a:rPr lang="es-MX" dirty="0" err="1"/>
+              <a:t>await</a:t>
+            </a:r>
+            <a:endParaRPr lang="es-MX" dirty="0"/>
+          </a:p>
+          <a:p>
+            <a:r>
+              <a:rPr lang="es-MX" dirty="0"/>
+              <a:t>PFX, PLINQ</a:t>
+            </a:r>
+          </a:p>
+          <a:p>
+            <a:endParaRPr lang="es-MX" dirty="0"/>
+          </a:p>
+          <a:p>
+            <a:endParaRPr lang="es-MX" dirty="0"/>
+          </a:p>
+          <a:p>
+            <a:endParaRPr lang="es-MX" dirty="0"/>
+          </a:p>
+          <a:p>
+            <a:pPr marL="0" indent="0">
+              <a:buNone/>
+            </a:pPr>
+            <a:endParaRPr lang="es-MX" dirty="0"/>
+          </a:p>
+        </p:txBody>
+      </p:sp>
+    </p:spTree>
+    <p:extLst>
+      <p:ext uri="{BB962C8B-B14F-4D97-AF65-F5344CB8AC3E}">
+        <p14:creationId xmlns:p14="http://schemas.microsoft.com/office/powerpoint/2010/main" val="3508183269"/>
+      </p:ext>
+    </p:extLst>
+  </p:cSld>
+  <p:clrMapOvr>
+    <a:masterClrMapping/>
+  </p:clrMapOvr>
+</p:sld>
+</file>
+
+<file path=ppt/slides/slide8.xml><?xml version="1.0" encoding="utf-8"?>
+<p:sld xmlns:a="http://schemas.openxmlformats.org/drawingml/2006/main" xmlns:r="http://schemas.openxmlformats.org/officeDocument/2006/relationships" xmlns:p="http://schemas.openxmlformats.org/presentationml/2006/main">
+  <p:cSld>
+    <p:spTree>
+      <p:nvGrpSpPr>
+        <p:cNvPr id="1" name=""/>
+        <p:cNvGrpSpPr/>
+        <p:nvPr/>
+      </p:nvGrpSpPr>
+      <p:grpSpPr>
+        <a:xfrm>
+          <a:off x="0" y="0"/>
+          <a:ext cx="0" cy="0"/>
+          <a:chOff x="0" y="0"/>
+          <a:chExt cx="0" cy="0"/>
+        </a:xfrm>
+      </p:grpSpPr>
+      <p:sp>
+        <p:nvSpPr>
+          <p:cNvPr id="2" name="Título 1">
+            <a:extLst>
+              <a:ext uri="{FF2B5EF4-FFF2-40B4-BE49-F238E27FC236}">
+                <a16:creationId xmlns:a16="http://schemas.microsoft.com/office/drawing/2014/main" id="{422D584E-DFA6-504A-DF09-FB6C1BED9CDB}"/>
+              </a:ext>
+            </a:extLst>
+          </p:cNvPr>
+          <p:cNvSpPr>
+            <a:spLocks noGrp="1"/>
+          </p:cNvSpPr>
+          <p:nvPr>
+            <p:ph type="ctrTitle"/>
+          </p:nvPr>
+        </p:nvSpPr>
+        <p:spPr/>
+        <p:txBody>
+          <a:bodyPr/>
+          <a:lstStyle/>
+          <a:p>
+            <a:r>
+              <a:rPr lang="es-MX" dirty="0" err="1"/>
+              <a:t>Code</a:t>
+            </a:r>
+            <a:r>
+              <a:rPr lang="es-MX" dirty="0"/>
+              <a:t> Time  </a:t>
+            </a:r>
+            <a:r>
+              <a:rPr lang="es-MX" dirty="0">
+                <a:sym typeface="Wingdings" panose="05000000000000000000" pitchFamily="2" charset="2"/>
+              </a:rPr>
+              <a:t></a:t>
+            </a:r>
+            <a:r>
+              <a:rPr lang="es-MX" dirty="0"/>
+              <a:t> </a:t>
+            </a:r>
+          </a:p>
+        </p:txBody>
+      </p:sp>
+      <p:sp>
+        <p:nvSpPr>
+          <p:cNvPr id="3" name="Subtítulo 2">
+            <a:extLst>
+              <a:ext uri="{FF2B5EF4-FFF2-40B4-BE49-F238E27FC236}">
+                <a16:creationId xmlns:a16="http://schemas.microsoft.com/office/drawing/2014/main" id="{27B5A0C9-730A-34D7-9FB5-BFF412D917CE}"/>
+              </a:ext>
+            </a:extLst>
+          </p:cNvPr>
+          <p:cNvSpPr>
+            <a:spLocks noGrp="1"/>
+          </p:cNvSpPr>
+          <p:nvPr>
+            <p:ph type="subTitle" idx="1"/>
+          </p:nvPr>
+        </p:nvSpPr>
+        <p:spPr/>
+        <p:txBody>
+          <a:bodyPr/>
+          <a:lstStyle/>
+          <a:p>
+            <a:endParaRPr lang="es-MX" dirty="0"/>
+          </a:p>
+        </p:txBody>
+      </p:sp>
+    </p:spTree>
+    <p:extLst>
+      <p:ext uri="{BB962C8B-B14F-4D97-AF65-F5344CB8AC3E}">
+        <p14:creationId xmlns:p14="http://schemas.microsoft.com/office/powerpoint/2010/main" val="3142671275"/>
+      </p:ext>
+    </p:extLst>
+  </p:cSld>
+  <p:clrMapOvr>
+    <a:masterClrMapping/>
+  </p:clrMapOvr>
+</p:sld>
+</file>
+
+<file path=ppt/slides/slide9.xml><?xml version="1.0" encoding="utf-8"?>
 <p:sld xmlns:a="http://schemas.openxmlformats.org/drawingml/2006/main" xmlns:r="http://schemas.openxmlformats.org/officeDocument/2006/relationships" xmlns:p="http://schemas.openxmlformats.org/presentationml/2006/main">
   <p:cSld>
     <p:bg>
@@ -9078,24 +9448,6 @@
 </file>
 
 <file path=customXml/item1.xml><?xml version="1.0" encoding="utf-8"?>
-<?mso-contentType ?>
-<FormTemplates xmlns="http://schemas.microsoft.com/sharepoint/v3/contenttype/forms">
-  <Display>DocumentLibraryForm</Display>
-  <Edit>DocumentLibraryForm</Edit>
-  <New>DocumentLibraryForm</New>
-</FormTemplates>
-</file>
-
-<file path=customXml/item2.xml><?xml version="1.0" encoding="utf-8"?>
-<p:properties xmlns:p="http://schemas.microsoft.com/office/2006/metadata/properties" xmlns:xsi="http://www.w3.org/2001/XMLSchema-instance" xmlns:pc="http://schemas.microsoft.com/office/infopath/2007/PartnerControls">
-  <documentManagement>
-    <Status xmlns="71af3243-3dd4-4a8d-8c0d-dd76da1f02a5">Not started</Status>
-    <MediaServiceKeyPoints xmlns="71af3243-3dd4-4a8d-8c0d-dd76da1f02a5" xsi:nil="true"/>
-  </documentManagement>
-</p:properties>
-</file>
-
-<file path=customXml/item3.xml><?xml version="1.0" encoding="utf-8"?>
 <ct:contentTypeSchema xmlns:ct="http://schemas.microsoft.com/office/2006/metadata/contentType" xmlns:ma="http://schemas.microsoft.com/office/2006/metadata/properties/metaAttributes" ct:_="" ma:_="" ma:contentTypeName="Document" ma:contentTypeID="0x01010079F111ED35F8CC479449609E8A0923A6" ma:contentTypeVersion="12" ma:contentTypeDescription="Create a new document." ma:contentTypeScope="" ma:versionID="93813dd7ca6ad654711aa0ab317e03a3">
   <xsd:schema xmlns:xsd="http://www.w3.org/2001/XMLSchema" xmlns:xs="http://www.w3.org/2001/XMLSchema" xmlns:p="http://schemas.microsoft.com/office/2006/metadata/properties" xmlns:ns2="71af3243-3dd4-4a8d-8c0d-dd76da1f02a5" xmlns:ns3="16c05727-aa75-4e4a-9b5f-8a80a1165891" targetNamespace="http://schemas.microsoft.com/office/2006/metadata/properties" ma:root="true" ma:fieldsID="f11dc0ce689dd3925e84e4e35398c6e7" ns2:_="" ns3:_="">
     <xsd:import namespace="71af3243-3dd4-4a8d-8c0d-dd76da1f02a5"/>
@@ -9316,25 +9668,25 @@
 </ct:contentTypeSchema>
 </file>
 
-<file path=customXml/itemProps1.xml><?xml version="1.0" encoding="utf-8"?>
-<ds:datastoreItem xmlns:ds="http://schemas.openxmlformats.org/officeDocument/2006/customXml" ds:itemID="{0D16958A-754B-4396-9457-FD7A427A37DD}">
-  <ds:schemaRefs>
-    <ds:schemaRef ds:uri="http://schemas.microsoft.com/sharepoint/v3/contenttype/forms"/>
-  </ds:schemaRefs>
-</ds:datastoreItem>
+<file path=customXml/item2.xml><?xml version="1.0" encoding="utf-8"?>
+<p:properties xmlns:p="http://schemas.microsoft.com/office/2006/metadata/properties" xmlns:xsi="http://www.w3.org/2001/XMLSchema-instance" xmlns:pc="http://schemas.microsoft.com/office/infopath/2007/PartnerControls">
+  <documentManagement>
+    <Status xmlns="71af3243-3dd4-4a8d-8c0d-dd76da1f02a5">Not started</Status>
+    <MediaServiceKeyPoints xmlns="71af3243-3dd4-4a8d-8c0d-dd76da1f02a5" xsi:nil="true"/>
+  </documentManagement>
+</p:properties>
 </file>
 
-<file path=customXml/itemProps2.xml><?xml version="1.0" encoding="utf-8"?>
-<ds:datastoreItem xmlns:ds="http://schemas.openxmlformats.org/officeDocument/2006/customXml" ds:itemID="{048C88F1-1664-415F-AFCE-F6CF45809817}">
-  <ds:schemaRefs>
-    <ds:schemaRef ds:uri="http://schemas.microsoft.com/office/2006/metadata/properties"/>
-    <ds:schemaRef ds:uri="http://schemas.microsoft.com/office/infopath/2007/PartnerControls"/>
-    <ds:schemaRef ds:uri="71af3243-3dd4-4a8d-8c0d-dd76da1f02a5"/>
-  </ds:schemaRefs>
-</ds:datastoreItem>
+<file path=customXml/item3.xml><?xml version="1.0" encoding="utf-8"?>
+<?mso-contentType ?>
+<FormTemplates xmlns="http://schemas.microsoft.com/sharepoint/v3/contenttype/forms">
+  <Display>DocumentLibraryForm</Display>
+  <Edit>DocumentLibraryForm</Edit>
+  <New>DocumentLibraryForm</New>
+</FormTemplates>
 </file>
 
-<file path=customXml/itemProps3.xml><?xml version="1.0" encoding="utf-8"?>
+<file path=customXml/itemProps1.xml><?xml version="1.0" encoding="utf-8"?>
 <ds:datastoreItem xmlns:ds="http://schemas.openxmlformats.org/officeDocument/2006/customXml" ds:itemID="{CC30393A-FEC6-4A44-9E4A-6EA49F1F7DC0}">
   <ds:schemaRefs>
     <ds:schemaRef ds:uri="http://schemas.microsoft.com/office/2006/metadata/contentType"/>
@@ -9351,4 +9703,22 @@
     <ds:schemaRef ds:uri="http://schemas.microsoft.com/internal/obd"/>
   </ds:schemaRefs>
 </ds:datastoreItem>
+</file>
+
+<file path=customXml/itemProps2.xml><?xml version="1.0" encoding="utf-8"?>
+<ds:datastoreItem xmlns:ds="http://schemas.openxmlformats.org/officeDocument/2006/customXml" ds:itemID="{048C88F1-1664-415F-AFCE-F6CF45809817}">
+  <ds:schemaRefs>
+    <ds:schemaRef ds:uri="http://schemas.microsoft.com/office/2006/metadata/properties"/>
+    <ds:schemaRef ds:uri="http://schemas.microsoft.com/office/infopath/2007/PartnerControls"/>
+    <ds:schemaRef ds:uri="71af3243-3dd4-4a8d-8c0d-dd76da1f02a5"/>
+  </ds:schemaRefs>
+</ds:datastoreItem>
+</file>
+
+<file path=customXml/itemProps3.xml><?xml version="1.0" encoding="utf-8"?>
+<ds:datastoreItem xmlns:ds="http://schemas.openxmlformats.org/officeDocument/2006/customXml" ds:itemID="{0D16958A-754B-4396-9457-FD7A427A37DD}">
+  <ds:schemaRefs>
+    <ds:schemaRef ds:uri="http://schemas.microsoft.com/sharepoint/v3/contenttype/forms"/>
+  </ds:schemaRefs>
+</ds:datastoreItem>
 </file>
</xml_diff>

<commit_message>
Added resources to Presentation
</commit_message>
<xml_diff>
--- a/Presentation/Multitask, Async and Parallel in C#.pptx
+++ b/Presentation/Multitask, Async and Parallel in C#.pptx
@@ -5,10 +5,10 @@
     <p:sldMasterId id="2147483648" r:id="rId4"/>
   </p:sldMasterIdLst>
   <p:notesMasterIdLst>
-    <p:notesMasterId r:id="rId15"/>
+    <p:notesMasterId r:id="rId16"/>
   </p:notesMasterIdLst>
   <p:handoutMasterIdLst>
-    <p:handoutMasterId r:id="rId16"/>
+    <p:handoutMasterId r:id="rId17"/>
   </p:handoutMasterIdLst>
   <p:sldIdLst>
     <p:sldId id="256" r:id="rId5"/>
@@ -19,8 +19,9 @@
     <p:sldId id="271" r:id="rId10"/>
     <p:sldId id="273" r:id="rId11"/>
     <p:sldId id="274" r:id="rId12"/>
-    <p:sldId id="267" r:id="rId13"/>
-    <p:sldId id="275" r:id="rId14"/>
+    <p:sldId id="276" r:id="rId13"/>
+    <p:sldId id="267" r:id="rId14"/>
+    <p:sldId id="275" r:id="rId15"/>
   </p:sldIdLst>
   <p:sldSz cx="12192000" cy="6858000"/>
   <p:notesSz cx="6858000" cy="9144000"/>
@@ -312,7 +313,7 @@
             <a:pPr rtl="0"/>
             <a:fld id="{EED32F08-9749-4F62-92D2-6C50931D99AA}" type="datetime1">
               <a:rPr lang="es-ES" smtClean="0"/>
-              <a:t>15/07/2022</a:t>
+              <a:t>28/07/2022</a:t>
             </a:fld>
             <a:endParaRPr lang="es-ES"/>
           </a:p>
@@ -494,7 +495,7 @@
             <a:pPr rtl="0"/>
             <a:fld id="{BECC33FF-8FBA-4A60-BBD8-B5DE3DF83D8B}" type="datetime1">
               <a:rPr lang="es-ES" noProof="0" smtClean="0"/>
-              <a:t>15/07/2022</a:t>
+              <a:t>28/07/2022</a:t>
             </a:fld>
             <a:endParaRPr lang="es-ES" noProof="0"/>
           </a:p>
@@ -918,7 +919,7 @@
             <a:pPr rtl="0"/>
             <a:fld id="{EE000EEB-8338-48D7-8EE8-EE0082EF7602}" type="slidenum">
               <a:rPr lang="es-ES" smtClean="0"/>
-              <a:t>9</a:t>
+              <a:t>10</a:t>
             </a:fld>
             <a:endParaRPr lang="es-ES"/>
           </a:p>
@@ -1121,7 +1122,7 @@
             <a:pPr rtl="0"/>
             <a:fld id="{4AAD347D-5ACD-4C99-B74B-A9C85AD731AF}" type="datetimeFigureOut">
               <a:rPr lang="es-ES" noProof="0" smtClean="0"/>
-              <a:t>15/07/2022</a:t>
+              <a:t>28/07/2022</a:t>
             </a:fld>
             <a:endParaRPr lang="es-ES" noProof="0"/>
           </a:p>
@@ -1394,7 +1395,7 @@
             <a:pPr rtl="0"/>
             <a:fld id="{4509A250-FF31-4206-8172-F9D3106AACB1}" type="datetimeFigureOut">
               <a:rPr lang="es-ES" noProof="0" smtClean="0"/>
-              <a:t>15/07/2022</a:t>
+              <a:t>28/07/2022</a:t>
             </a:fld>
             <a:endParaRPr lang="es-ES" noProof="0"/>
           </a:p>
@@ -1586,7 +1587,7 @@
             <a:pPr rtl="0"/>
             <a:fld id="{4509A250-FF31-4206-8172-F9D3106AACB1}" type="datetimeFigureOut">
               <a:rPr lang="es-ES" noProof="0" smtClean="0"/>
-              <a:t>15/07/2022</a:t>
+              <a:t>28/07/2022</a:t>
             </a:fld>
             <a:endParaRPr lang="es-ES" noProof="0"/>
           </a:p>
@@ -1852,7 +1853,7 @@
             <a:pPr rtl="0"/>
             <a:fld id="{4509A250-FF31-4206-8172-F9D3106AACB1}" type="datetimeFigureOut">
               <a:rPr lang="es-ES" noProof="0" smtClean="0"/>
-              <a:t>15/07/2022</a:t>
+              <a:t>28/07/2022</a:t>
             </a:fld>
             <a:endParaRPr lang="es-ES" noProof="0"/>
           </a:p>
@@ -2182,7 +2183,7 @@
             <a:pPr rtl="0"/>
             <a:fld id="{4509A250-FF31-4206-8172-F9D3106AACB1}" type="datetimeFigureOut">
               <a:rPr lang="es-ES" noProof="0" smtClean="0"/>
-              <a:t>15/07/2022</a:t>
+              <a:t>28/07/2022</a:t>
             </a:fld>
             <a:endParaRPr lang="es-ES" noProof="0"/>
           </a:p>
@@ -2790,7 +2791,7 @@
             <a:pPr rtl="0"/>
             <a:fld id="{4509A250-FF31-4206-8172-F9D3106AACB1}" type="datetimeFigureOut">
               <a:rPr lang="es-ES" noProof="0" smtClean="0"/>
-              <a:t>15/07/2022</a:t>
+              <a:t>28/07/2022</a:t>
             </a:fld>
             <a:endParaRPr lang="es-ES" noProof="0"/>
           </a:p>
@@ -3635,7 +3636,7 @@
             <a:pPr rtl="0"/>
             <a:fld id="{4509A250-FF31-4206-8172-F9D3106AACB1}" type="datetimeFigureOut">
               <a:rPr lang="es-ES" noProof="0" smtClean="0"/>
-              <a:t>15/07/2022</a:t>
+              <a:t>28/07/2022</a:t>
             </a:fld>
             <a:endParaRPr lang="es-ES" noProof="0"/>
           </a:p>
@@ -3802,7 +3803,7 @@
             <a:pPr rtl="0"/>
             <a:fld id="{4509A250-FF31-4206-8172-F9D3106AACB1}" type="datetimeFigureOut">
               <a:rPr lang="es-ES" noProof="0" smtClean="0"/>
-              <a:t>15/07/2022</a:t>
+              <a:t>28/07/2022</a:t>
             </a:fld>
             <a:endParaRPr lang="es-ES" noProof="0"/>
           </a:p>
@@ -3979,7 +3980,7 @@
             <a:pPr rtl="0"/>
             <a:fld id="{4509A250-FF31-4206-8172-F9D3106AACB1}" type="datetimeFigureOut">
               <a:rPr lang="es-ES" noProof="0" smtClean="0"/>
-              <a:t>15/07/2022</a:t>
+              <a:t>28/07/2022</a:t>
             </a:fld>
             <a:endParaRPr lang="es-ES" noProof="0"/>
           </a:p>
@@ -4146,7 +4147,7 @@
             <a:pPr rtl="0"/>
             <a:fld id="{4509A250-FF31-4206-8172-F9D3106AACB1}" type="datetimeFigureOut">
               <a:rPr lang="es-ES" noProof="0" smtClean="0"/>
-              <a:t>15/07/2022</a:t>
+              <a:t>28/07/2022</a:t>
             </a:fld>
             <a:endParaRPr lang="es-ES" noProof="0"/>
           </a:p>
@@ -4388,7 +4389,7 @@
             <a:pPr rtl="0"/>
             <a:fld id="{4509A250-FF31-4206-8172-F9D3106AACB1}" type="datetimeFigureOut">
               <a:rPr lang="es-ES" noProof="0" smtClean="0"/>
-              <a:t>15/07/2022</a:t>
+              <a:t>28/07/2022</a:t>
             </a:fld>
             <a:endParaRPr lang="es-ES" noProof="0"/>
           </a:p>
@@ -4676,7 +4677,7 @@
             <a:pPr rtl="0"/>
             <a:fld id="{4509A250-FF31-4206-8172-F9D3106AACB1}" type="datetimeFigureOut">
               <a:rPr lang="es-ES" noProof="0" smtClean="0"/>
-              <a:t>15/07/2022</a:t>
+              <a:t>28/07/2022</a:t>
             </a:fld>
             <a:endParaRPr lang="es-ES" noProof="0"/>
           </a:p>
@@ -5110,7 +5111,7 @@
             <a:pPr rtl="0"/>
             <a:fld id="{4509A250-FF31-4206-8172-F9D3106AACB1}" type="datetimeFigureOut">
               <a:rPr lang="es-ES" noProof="0" smtClean="0"/>
-              <a:t>15/07/2022</a:t>
+              <a:t>28/07/2022</a:t>
             </a:fld>
             <a:endParaRPr lang="es-ES" noProof="0"/>
           </a:p>
@@ -5226,7 +5227,7 @@
             <a:pPr rtl="0"/>
             <a:fld id="{4509A250-FF31-4206-8172-F9D3106AACB1}" type="datetimeFigureOut">
               <a:rPr lang="es-ES" noProof="0" smtClean="0"/>
-              <a:t>15/07/2022</a:t>
+              <a:t>28/07/2022</a:t>
             </a:fld>
             <a:endParaRPr lang="es-ES" noProof="0"/>
           </a:p>
@@ -5319,7 +5320,7 @@
             <a:pPr rtl="0"/>
             <a:fld id="{4509A250-FF31-4206-8172-F9D3106AACB1}" type="datetimeFigureOut">
               <a:rPr lang="es-ES" noProof="0" smtClean="0"/>
-              <a:t>15/07/2022</a:t>
+              <a:t>28/07/2022</a:t>
             </a:fld>
             <a:endParaRPr lang="es-ES" noProof="0"/>
           </a:p>
@@ -5595,7 +5596,7 @@
             <a:pPr rtl="0"/>
             <a:fld id="{4509A250-FF31-4206-8172-F9D3106AACB1}" type="datetimeFigureOut">
               <a:rPr lang="es-ES" noProof="0" smtClean="0"/>
-              <a:t>15/07/2022</a:t>
+              <a:t>28/07/2022</a:t>
             </a:fld>
             <a:endParaRPr lang="es-ES" noProof="0"/>
           </a:p>
@@ -5868,7 +5869,7 @@
             <a:pPr rtl="0"/>
             <a:fld id="{4509A250-FF31-4206-8172-F9D3106AACB1}" type="datetimeFigureOut">
               <a:rPr lang="es-ES" noProof="0" smtClean="0"/>
-              <a:t>15/07/2022</a:t>
+              <a:t>28/07/2022</a:t>
             </a:fld>
             <a:endParaRPr lang="es-ES" noProof="0"/>
           </a:p>
@@ -6294,7 +6295,7 @@
             <a:pPr rtl="0"/>
             <a:fld id="{4509A250-FF31-4206-8172-F9D3106AACB1}" type="datetimeFigureOut">
               <a:rPr lang="es-ES" noProof="0" smtClean="0"/>
-              <a:t>15/07/2022</a:t>
+              <a:t>28/07/2022</a:t>
             </a:fld>
             <a:endParaRPr lang="es-ES" noProof="0"/>
           </a:p>
@@ -7040,1343 +7041,6 @@
 <file path=ppt/slides/slide10.xml><?xml version="1.0" encoding="utf-8"?>
 <p:sld xmlns:a="http://schemas.openxmlformats.org/drawingml/2006/main" xmlns:r="http://schemas.openxmlformats.org/officeDocument/2006/relationships" xmlns:p="http://schemas.openxmlformats.org/presentationml/2006/main">
   <p:cSld>
-    <p:spTree>
-      <p:nvGrpSpPr>
-        <p:cNvPr id="1" name=""/>
-        <p:cNvGrpSpPr/>
-        <p:nvPr/>
-      </p:nvGrpSpPr>
-      <p:grpSpPr>
-        <a:xfrm>
-          <a:off x="0" y="0"/>
-          <a:ext cx="0" cy="0"/>
-          <a:chOff x="0" y="0"/>
-          <a:chExt cx="0" cy="0"/>
-        </a:xfrm>
-      </p:grpSpPr>
-      <p:sp>
-        <p:nvSpPr>
-          <p:cNvPr id="2" name="Título 1">
-            <a:extLst>
-              <a:ext uri="{FF2B5EF4-FFF2-40B4-BE49-F238E27FC236}">
-                <a16:creationId xmlns:a16="http://schemas.microsoft.com/office/drawing/2014/main" id="{96B4C46F-1726-872F-0A81-A010DB66C17A}"/>
-              </a:ext>
-            </a:extLst>
-          </p:cNvPr>
-          <p:cNvSpPr>
-            <a:spLocks noGrp="1"/>
-          </p:cNvSpPr>
-          <p:nvPr>
-            <p:ph type="ctrTitle"/>
-          </p:nvPr>
-        </p:nvSpPr>
-        <p:spPr/>
-        <p:txBody>
-          <a:bodyPr/>
-          <a:lstStyle/>
-          <a:p>
-            <a:r>
-              <a:rPr lang="es-MX" dirty="0" err="1"/>
-              <a:t>Questions</a:t>
-            </a:r>
-            <a:r>
-              <a:rPr lang="es-MX" dirty="0"/>
-              <a:t>?</a:t>
-            </a:r>
-          </a:p>
-        </p:txBody>
-      </p:sp>
-      <p:sp>
-        <p:nvSpPr>
-          <p:cNvPr id="3" name="Subtítulo 2">
-            <a:extLst>
-              <a:ext uri="{FF2B5EF4-FFF2-40B4-BE49-F238E27FC236}">
-                <a16:creationId xmlns:a16="http://schemas.microsoft.com/office/drawing/2014/main" id="{8AD2D9DC-7BDC-2AA1-C359-F61BDC156A1F}"/>
-              </a:ext>
-            </a:extLst>
-          </p:cNvPr>
-          <p:cNvSpPr>
-            <a:spLocks noGrp="1"/>
-          </p:cNvSpPr>
-          <p:nvPr>
-            <p:ph type="subTitle" idx="1"/>
-          </p:nvPr>
-        </p:nvSpPr>
-        <p:spPr/>
-        <p:txBody>
-          <a:bodyPr/>
-          <a:lstStyle/>
-          <a:p>
-            <a:endParaRPr lang="es-MX" dirty="0"/>
-          </a:p>
-        </p:txBody>
-      </p:sp>
-    </p:spTree>
-    <p:extLst>
-      <p:ext uri="{BB962C8B-B14F-4D97-AF65-F5344CB8AC3E}">
-        <p14:creationId xmlns:p14="http://schemas.microsoft.com/office/powerpoint/2010/main" val="4191166655"/>
-      </p:ext>
-    </p:extLst>
-  </p:cSld>
-  <p:clrMapOvr>
-    <a:masterClrMapping/>
-  </p:clrMapOvr>
-</p:sld>
-</file>
-
-<file path=ppt/slides/slide2.xml><?xml version="1.0" encoding="utf-8"?>
-<p:sld xmlns:a="http://schemas.openxmlformats.org/drawingml/2006/main" xmlns:r="http://schemas.openxmlformats.org/officeDocument/2006/relationships" xmlns:p="http://schemas.openxmlformats.org/presentationml/2006/main">
-  <p:cSld>
-    <p:spTree>
-      <p:nvGrpSpPr>
-        <p:cNvPr id="1" name=""/>
-        <p:cNvGrpSpPr/>
-        <p:nvPr/>
-      </p:nvGrpSpPr>
-      <p:grpSpPr>
-        <a:xfrm>
-          <a:off x="0" y="0"/>
-          <a:ext cx="0" cy="0"/>
-          <a:chOff x="0" y="0"/>
-          <a:chExt cx="0" cy="0"/>
-        </a:xfrm>
-      </p:grpSpPr>
-      <p:sp>
-        <p:nvSpPr>
-          <p:cNvPr id="2" name="Título 1">
-            <a:extLst>
-              <a:ext uri="{FF2B5EF4-FFF2-40B4-BE49-F238E27FC236}">
-                <a16:creationId xmlns:a16="http://schemas.microsoft.com/office/drawing/2014/main" id="{039A9E4D-7889-3490-92D8-D7D1CB98F7F3}"/>
-              </a:ext>
-            </a:extLst>
-          </p:cNvPr>
-          <p:cNvSpPr>
-            <a:spLocks noGrp="1"/>
-          </p:cNvSpPr>
-          <p:nvPr>
-            <p:ph type="title"/>
-          </p:nvPr>
-        </p:nvSpPr>
-        <p:spPr/>
-        <p:txBody>
-          <a:bodyPr/>
-          <a:lstStyle/>
-          <a:p>
-            <a:r>
-              <a:rPr lang="es-MX" dirty="0" err="1"/>
-              <a:t>About</a:t>
-            </a:r>
-            <a:r>
-              <a:rPr lang="es-MX" dirty="0"/>
-              <a:t> me</a:t>
-            </a:r>
-          </a:p>
-        </p:txBody>
-      </p:sp>
-      <p:sp>
-        <p:nvSpPr>
-          <p:cNvPr id="3" name="Marcador de contenido 2">
-            <a:extLst>
-              <a:ext uri="{FF2B5EF4-FFF2-40B4-BE49-F238E27FC236}">
-                <a16:creationId xmlns:a16="http://schemas.microsoft.com/office/drawing/2014/main" id="{51C96787-3C54-0E42-4F41-C2125EE9B2F3}"/>
-              </a:ext>
-            </a:extLst>
-          </p:cNvPr>
-          <p:cNvSpPr>
-            <a:spLocks noGrp="1"/>
-          </p:cNvSpPr>
-          <p:nvPr>
-            <p:ph idx="1"/>
-          </p:nvPr>
-        </p:nvSpPr>
-        <p:spPr/>
-        <p:txBody>
-          <a:bodyPr>
-            <a:normAutofit lnSpcReduction="10000"/>
-          </a:bodyPr>
-          <a:lstStyle/>
-          <a:p>
-            <a:r>
-              <a:rPr lang="es-MX" dirty="0" err="1"/>
-              <a:t>I’m</a:t>
-            </a:r>
-            <a:r>
-              <a:rPr lang="es-MX" dirty="0"/>
-              <a:t> </a:t>
-            </a:r>
-            <a:r>
-              <a:rPr lang="es-MX" dirty="0" err="1"/>
-              <a:t>Mexican</a:t>
-            </a:r>
-            <a:endParaRPr lang="es-MX" dirty="0"/>
-          </a:p>
-          <a:p>
-            <a:r>
-              <a:rPr lang="es-MX" dirty="0" err="1"/>
-              <a:t>Married</a:t>
-            </a:r>
-            <a:r>
-              <a:rPr lang="es-MX" dirty="0"/>
-              <a:t> </a:t>
-            </a:r>
-            <a:r>
-              <a:rPr lang="es-MX" dirty="0" err="1"/>
-              <a:t>with</a:t>
-            </a:r>
-            <a:r>
-              <a:rPr lang="es-MX" dirty="0"/>
-              <a:t> </a:t>
-            </a:r>
-            <a:r>
-              <a:rPr lang="es-MX" dirty="0" err="1"/>
-              <a:t>only</a:t>
-            </a:r>
-            <a:r>
-              <a:rPr lang="es-MX" dirty="0"/>
-              <a:t> </a:t>
-            </a:r>
-            <a:r>
-              <a:rPr lang="es-MX" dirty="0" err="1"/>
-              <a:t>one</a:t>
-            </a:r>
-            <a:r>
-              <a:rPr lang="es-MX" dirty="0"/>
-              <a:t> </a:t>
-            </a:r>
-            <a:r>
-              <a:rPr lang="es-MX" dirty="0" err="1"/>
-              <a:t>daughter</a:t>
-            </a:r>
-            <a:r>
-              <a:rPr lang="es-MX" dirty="0"/>
-              <a:t> </a:t>
-            </a:r>
-          </a:p>
-          <a:p>
-            <a:r>
-              <a:rPr lang="es-MX" dirty="0"/>
-              <a:t>.NET </a:t>
-            </a:r>
-            <a:r>
-              <a:rPr lang="es-MX" dirty="0" err="1"/>
-              <a:t>Developer</a:t>
-            </a:r>
-            <a:r>
-              <a:rPr lang="es-MX" dirty="0"/>
-              <a:t> </a:t>
-            </a:r>
-            <a:r>
-              <a:rPr lang="es-MX" dirty="0" err="1"/>
-              <a:t>for</a:t>
-            </a:r>
-            <a:r>
-              <a:rPr lang="es-MX" dirty="0"/>
-              <a:t> so </a:t>
-            </a:r>
-            <a:r>
-              <a:rPr lang="es-MX" dirty="0" err="1"/>
-              <a:t>long</a:t>
-            </a:r>
-            <a:r>
-              <a:rPr lang="es-MX" dirty="0"/>
-              <a:t> time</a:t>
-            </a:r>
-          </a:p>
-          <a:p>
-            <a:r>
-              <a:rPr lang="es-MX" dirty="0"/>
-              <a:t>Full </a:t>
-            </a:r>
-            <a:r>
-              <a:rPr lang="es-MX" dirty="0" err="1"/>
-              <a:t>stack</a:t>
-            </a:r>
-            <a:r>
-              <a:rPr lang="es-MX" dirty="0"/>
-              <a:t> Web </a:t>
-            </a:r>
-            <a:r>
-              <a:rPr lang="es-MX" dirty="0" err="1"/>
-              <a:t>Developer</a:t>
-            </a:r>
-            <a:r>
-              <a:rPr lang="es-MX" dirty="0"/>
-              <a:t> (Angular, </a:t>
-            </a:r>
-            <a:r>
-              <a:rPr lang="es-MX" dirty="0" err="1"/>
-              <a:t>React</a:t>
-            </a:r>
-            <a:r>
-              <a:rPr lang="es-MX" dirty="0"/>
-              <a:t>)</a:t>
-            </a:r>
-          </a:p>
-          <a:p>
-            <a:r>
-              <a:rPr lang="es-MX" dirty="0" err="1"/>
-              <a:t>Currently</a:t>
-            </a:r>
-            <a:r>
-              <a:rPr lang="es-MX" dirty="0"/>
-              <a:t> Senior Middleware </a:t>
-            </a:r>
-            <a:r>
-              <a:rPr lang="es-MX" dirty="0" err="1"/>
-              <a:t>Developer</a:t>
-            </a:r>
-            <a:r>
-              <a:rPr lang="es-MX" dirty="0"/>
-              <a:t> in Chamberlain </a:t>
-            </a:r>
-            <a:r>
-              <a:rPr lang="es-MX" dirty="0" err="1"/>
-              <a:t>project</a:t>
-            </a:r>
-            <a:endParaRPr lang="es-MX" dirty="0"/>
-          </a:p>
-          <a:p>
-            <a:r>
-              <a:rPr lang="es-MX" dirty="0"/>
-              <a:t>Regular </a:t>
-            </a:r>
-            <a:r>
-              <a:rPr lang="es-MX" dirty="0" err="1"/>
-              <a:t>posting</a:t>
-            </a:r>
-            <a:r>
-              <a:rPr lang="es-MX" dirty="0"/>
-              <a:t> in .NET </a:t>
-            </a:r>
-            <a:r>
-              <a:rPr lang="es-MX" dirty="0" err="1"/>
-              <a:t>Chapter</a:t>
-            </a:r>
-            <a:r>
-              <a:rPr lang="es-MX" dirty="0"/>
-              <a:t> </a:t>
-            </a:r>
-            <a:r>
-              <a:rPr lang="es-MX" dirty="0" err="1"/>
-              <a:t>Community</a:t>
-            </a:r>
-            <a:r>
-              <a:rPr lang="es-MX" dirty="0"/>
-              <a:t> in </a:t>
-            </a:r>
-            <a:r>
-              <a:rPr lang="es-MX" dirty="0" err="1"/>
-              <a:t>Workplace</a:t>
-            </a:r>
-            <a:endParaRPr lang="es-MX" dirty="0"/>
-          </a:p>
-          <a:p>
-            <a:r>
-              <a:rPr lang="es-MX" dirty="0"/>
-              <a:t>Data </a:t>
-            </a:r>
-            <a:r>
-              <a:rPr lang="es-MX" dirty="0" err="1"/>
-              <a:t>scientist</a:t>
-            </a:r>
-            <a:r>
-              <a:rPr lang="es-MX" dirty="0"/>
-              <a:t> </a:t>
-            </a:r>
-            <a:r>
-              <a:rPr lang="es-MX" dirty="0" err="1"/>
-              <a:t>newbie</a:t>
-            </a:r>
-            <a:endParaRPr lang="es-MX" dirty="0"/>
-          </a:p>
-          <a:p>
-            <a:endParaRPr lang="es-MX" dirty="0"/>
-          </a:p>
-          <a:p>
-            <a:endParaRPr lang="es-MX" dirty="0"/>
-          </a:p>
-          <a:p>
-            <a:pPr marL="0" indent="0">
-              <a:buNone/>
-            </a:pPr>
-            <a:r>
-              <a:rPr lang="es-MX" dirty="0"/>
-              <a:t>Twitter  LinkedIn GitHub @dacanetdev </a:t>
-            </a:r>
-          </a:p>
-        </p:txBody>
-      </p:sp>
-    </p:spTree>
-    <p:extLst>
-      <p:ext uri="{BB962C8B-B14F-4D97-AF65-F5344CB8AC3E}">
-        <p14:creationId xmlns:p14="http://schemas.microsoft.com/office/powerpoint/2010/main" val="1551156344"/>
-      </p:ext>
-    </p:extLst>
-  </p:cSld>
-  <p:clrMapOvr>
-    <a:masterClrMapping/>
-  </p:clrMapOvr>
-</p:sld>
-</file>
-
-<file path=ppt/slides/slide3.xml><?xml version="1.0" encoding="utf-8"?>
-<p:sld xmlns:a="http://schemas.openxmlformats.org/drawingml/2006/main" xmlns:r="http://schemas.openxmlformats.org/officeDocument/2006/relationships" xmlns:p="http://schemas.openxmlformats.org/presentationml/2006/main">
-  <p:cSld>
-    <p:spTree>
-      <p:nvGrpSpPr>
-        <p:cNvPr id="1" name=""/>
-        <p:cNvGrpSpPr/>
-        <p:nvPr/>
-      </p:nvGrpSpPr>
-      <p:grpSpPr>
-        <a:xfrm>
-          <a:off x="0" y="0"/>
-          <a:ext cx="0" cy="0"/>
-          <a:chOff x="0" y="0"/>
-          <a:chExt cx="0" cy="0"/>
-        </a:xfrm>
-      </p:grpSpPr>
-      <p:sp>
-        <p:nvSpPr>
-          <p:cNvPr id="2" name="Título 1">
-            <a:extLst>
-              <a:ext uri="{FF2B5EF4-FFF2-40B4-BE49-F238E27FC236}">
-                <a16:creationId xmlns:a16="http://schemas.microsoft.com/office/drawing/2014/main" id="{039A9E4D-7889-3490-92D8-D7D1CB98F7F3}"/>
-              </a:ext>
-            </a:extLst>
-          </p:cNvPr>
-          <p:cNvSpPr>
-            <a:spLocks noGrp="1"/>
-          </p:cNvSpPr>
-          <p:nvPr>
-            <p:ph type="title"/>
-          </p:nvPr>
-        </p:nvSpPr>
-        <p:spPr/>
-        <p:txBody>
-          <a:bodyPr/>
-          <a:lstStyle/>
-          <a:p>
-            <a:r>
-              <a:rPr lang="es-MX" dirty="0"/>
-              <a:t>Agenda</a:t>
-            </a:r>
-          </a:p>
-        </p:txBody>
-      </p:sp>
-      <p:sp>
-        <p:nvSpPr>
-          <p:cNvPr id="3" name="Marcador de contenido 2">
-            <a:extLst>
-              <a:ext uri="{FF2B5EF4-FFF2-40B4-BE49-F238E27FC236}">
-                <a16:creationId xmlns:a16="http://schemas.microsoft.com/office/drawing/2014/main" id="{51C96787-3C54-0E42-4F41-C2125EE9B2F3}"/>
-              </a:ext>
-            </a:extLst>
-          </p:cNvPr>
-          <p:cNvSpPr>
-            <a:spLocks noGrp="1"/>
-          </p:cNvSpPr>
-          <p:nvPr>
-            <p:ph idx="1"/>
-          </p:nvPr>
-        </p:nvSpPr>
-        <p:spPr/>
-        <p:txBody>
-          <a:bodyPr/>
-          <a:lstStyle/>
-          <a:p>
-            <a:r>
-              <a:rPr lang="es-MX" dirty="0"/>
-              <a:t>General </a:t>
-            </a:r>
-            <a:r>
-              <a:rPr lang="es-MX" dirty="0" err="1"/>
-              <a:t>Concepts</a:t>
-            </a:r>
-            <a:endParaRPr lang="es-MX" dirty="0"/>
-          </a:p>
-          <a:p>
-            <a:r>
-              <a:rPr lang="es-MX" dirty="0" err="1"/>
-              <a:t>Why</a:t>
-            </a:r>
-            <a:r>
-              <a:rPr lang="es-MX" dirty="0"/>
-              <a:t> multitasking </a:t>
-            </a:r>
-            <a:r>
-              <a:rPr lang="es-MX" dirty="0" err="1"/>
-              <a:t>or</a:t>
-            </a:r>
-            <a:r>
-              <a:rPr lang="es-MX" dirty="0"/>
-              <a:t> </a:t>
-            </a:r>
-            <a:r>
-              <a:rPr lang="es-MX" dirty="0" err="1"/>
-              <a:t>parallel</a:t>
-            </a:r>
-            <a:r>
-              <a:rPr lang="es-MX" dirty="0"/>
-              <a:t>?</a:t>
-            </a:r>
-          </a:p>
-          <a:p>
-            <a:r>
-              <a:rPr lang="es-MX" dirty="0"/>
-              <a:t>C# </a:t>
-            </a:r>
-            <a:r>
-              <a:rPr lang="es-MX" dirty="0" err="1"/>
-              <a:t>Implementation</a:t>
-            </a:r>
-            <a:r>
-              <a:rPr lang="es-MX" dirty="0"/>
-              <a:t> </a:t>
-            </a:r>
-            <a:r>
-              <a:rPr lang="es-MX" dirty="0" err="1"/>
-              <a:t>options</a:t>
-            </a:r>
-            <a:endParaRPr lang="es-MX" dirty="0"/>
-          </a:p>
-          <a:p>
-            <a:r>
-              <a:rPr lang="es-MX" dirty="0" err="1"/>
-              <a:t>Measuring</a:t>
-            </a:r>
-            <a:r>
-              <a:rPr lang="es-MX" dirty="0"/>
-              <a:t> Performance</a:t>
-            </a:r>
-          </a:p>
-          <a:p>
-            <a:r>
-              <a:rPr lang="es-MX" dirty="0"/>
-              <a:t>C# </a:t>
-            </a:r>
-            <a:r>
-              <a:rPr lang="es-MX" dirty="0" err="1"/>
-              <a:t>solutions</a:t>
-            </a:r>
-            <a:r>
-              <a:rPr lang="es-MX" dirty="0"/>
-              <a:t> (</a:t>
-            </a:r>
-            <a:r>
-              <a:rPr lang="es-MX" dirty="0" err="1"/>
-              <a:t>with</a:t>
-            </a:r>
-            <a:r>
-              <a:rPr lang="es-MX" dirty="0"/>
-              <a:t> </a:t>
-            </a:r>
-            <a:r>
-              <a:rPr lang="es-MX" dirty="0" err="1"/>
-              <a:t>code</a:t>
-            </a:r>
-            <a:r>
-              <a:rPr lang="es-MX" dirty="0"/>
-              <a:t> </a:t>
-            </a:r>
-            <a:r>
-              <a:rPr lang="es-MX" dirty="0" err="1"/>
-              <a:t>examples</a:t>
-            </a:r>
-            <a:r>
-              <a:rPr lang="es-MX" dirty="0"/>
-              <a:t>)</a:t>
-            </a:r>
-          </a:p>
-          <a:p>
-            <a:r>
-              <a:rPr lang="es-MX" dirty="0"/>
-              <a:t>Q &amp; A</a:t>
-            </a:r>
-          </a:p>
-          <a:p>
-            <a:endParaRPr lang="es-MX" dirty="0"/>
-          </a:p>
-          <a:p>
-            <a:endParaRPr lang="es-MX" dirty="0"/>
-          </a:p>
-          <a:p>
-            <a:endParaRPr lang="es-MX" dirty="0"/>
-          </a:p>
-          <a:p>
-            <a:pPr marL="0" indent="0">
-              <a:buNone/>
-            </a:pPr>
-            <a:endParaRPr lang="es-MX" dirty="0"/>
-          </a:p>
-        </p:txBody>
-      </p:sp>
-    </p:spTree>
-    <p:extLst>
-      <p:ext uri="{BB962C8B-B14F-4D97-AF65-F5344CB8AC3E}">
-        <p14:creationId xmlns:p14="http://schemas.microsoft.com/office/powerpoint/2010/main" val="661867213"/>
-      </p:ext>
-    </p:extLst>
-  </p:cSld>
-  <p:clrMapOvr>
-    <a:masterClrMapping/>
-  </p:clrMapOvr>
-</p:sld>
-</file>
-
-<file path=ppt/slides/slide4.xml><?xml version="1.0" encoding="utf-8"?>
-<p:sld xmlns:a="http://schemas.openxmlformats.org/drawingml/2006/main" xmlns:r="http://schemas.openxmlformats.org/officeDocument/2006/relationships" xmlns:p="http://schemas.openxmlformats.org/presentationml/2006/main">
-  <p:cSld>
-    <p:spTree>
-      <p:nvGrpSpPr>
-        <p:cNvPr id="1" name=""/>
-        <p:cNvGrpSpPr/>
-        <p:nvPr/>
-      </p:nvGrpSpPr>
-      <p:grpSpPr>
-        <a:xfrm>
-          <a:off x="0" y="0"/>
-          <a:ext cx="0" cy="0"/>
-          <a:chOff x="0" y="0"/>
-          <a:chExt cx="0" cy="0"/>
-        </a:xfrm>
-      </p:grpSpPr>
-      <p:sp>
-        <p:nvSpPr>
-          <p:cNvPr id="2" name="Título 1">
-            <a:extLst>
-              <a:ext uri="{FF2B5EF4-FFF2-40B4-BE49-F238E27FC236}">
-                <a16:creationId xmlns:a16="http://schemas.microsoft.com/office/drawing/2014/main" id="{039A9E4D-7889-3490-92D8-D7D1CB98F7F3}"/>
-              </a:ext>
-            </a:extLst>
-          </p:cNvPr>
-          <p:cNvSpPr>
-            <a:spLocks noGrp="1"/>
-          </p:cNvSpPr>
-          <p:nvPr>
-            <p:ph type="title"/>
-          </p:nvPr>
-        </p:nvSpPr>
-        <p:spPr/>
-        <p:txBody>
-          <a:bodyPr/>
-          <a:lstStyle/>
-          <a:p>
-            <a:r>
-              <a:rPr lang="es-MX" dirty="0"/>
-              <a:t>General </a:t>
-            </a:r>
-            <a:r>
-              <a:rPr lang="es-MX" dirty="0" err="1"/>
-              <a:t>Concepts</a:t>
-            </a:r>
-            <a:endParaRPr lang="es-MX" dirty="0"/>
-          </a:p>
-        </p:txBody>
-      </p:sp>
-      <p:sp>
-        <p:nvSpPr>
-          <p:cNvPr id="3" name="Marcador de contenido 2">
-            <a:extLst>
-              <a:ext uri="{FF2B5EF4-FFF2-40B4-BE49-F238E27FC236}">
-                <a16:creationId xmlns:a16="http://schemas.microsoft.com/office/drawing/2014/main" id="{51C96787-3C54-0E42-4F41-C2125EE9B2F3}"/>
-              </a:ext>
-            </a:extLst>
-          </p:cNvPr>
-          <p:cNvSpPr>
-            <a:spLocks noGrp="1"/>
-          </p:cNvSpPr>
-          <p:nvPr>
-            <p:ph idx="1"/>
-          </p:nvPr>
-        </p:nvSpPr>
-        <p:spPr/>
-        <p:txBody>
-          <a:bodyPr>
-            <a:normAutofit fontScale="85000" lnSpcReduction="10000"/>
-          </a:bodyPr>
-          <a:lstStyle/>
-          <a:p>
-            <a:r>
-              <a:rPr lang="es-MX" b="1" dirty="0" err="1"/>
-              <a:t>Process</a:t>
-            </a:r>
-            <a:r>
-              <a:rPr lang="es-MX" dirty="0"/>
-              <a:t>: </a:t>
-            </a:r>
-            <a:r>
-              <a:rPr lang="en-US" dirty="0"/>
-              <a:t>The concept of a “process” existed within Windows-based operating systems well before the release of the .NET/.NET Core platforms. In simple terms, a process is a running program.</a:t>
-            </a:r>
-          </a:p>
-          <a:p>
-            <a:endParaRPr lang="es-MX" dirty="0"/>
-          </a:p>
-          <a:p>
-            <a:r>
-              <a:rPr lang="es-MX" b="1" dirty="0" err="1"/>
-              <a:t>Thread</a:t>
-            </a:r>
-            <a:r>
-              <a:rPr lang="es-MX" b="1" dirty="0"/>
-              <a:t>: </a:t>
-            </a:r>
-            <a:r>
-              <a:rPr lang="en-US" dirty="0"/>
-              <a:t>A thread is the smallest unit in an operating system, and it executes instructions in the processor. A process is a bigger executing container, and the thread inside the process is the smallest unit to use processor time and execute instructions.</a:t>
-            </a:r>
-            <a:r>
-              <a:rPr lang="en-US" b="1" dirty="0"/>
-              <a:t> </a:t>
-            </a:r>
-            <a:r>
-              <a:rPr lang="en-US" dirty="0"/>
-              <a:t>A thread is an execution path that can proceed independently of others. Each thread runs within an operating system process, which provides an isolated environment in which a program runs. </a:t>
-            </a:r>
-          </a:p>
-          <a:p>
-            <a:endParaRPr lang="en-US" dirty="0"/>
-          </a:p>
-          <a:p>
-            <a:r>
-              <a:rPr lang="en-US" b="1" dirty="0"/>
-              <a:t>Multithreading</a:t>
-            </a:r>
-            <a:r>
-              <a:rPr lang="en-US" dirty="0"/>
-              <a:t>: With a multithreaded program, multiple threads run in a single process, sharing the same execution environment (memory). Multithreaded processes provide the illusion that numerous activities are happening at the same time.</a:t>
-            </a:r>
-            <a:endParaRPr lang="es-MX" dirty="0"/>
-          </a:p>
-          <a:p>
-            <a:endParaRPr lang="es-MX" dirty="0"/>
-          </a:p>
-          <a:p>
-            <a:endParaRPr lang="es-MX" dirty="0"/>
-          </a:p>
-          <a:p>
-            <a:pPr marL="0" indent="0">
-              <a:buNone/>
-            </a:pPr>
-            <a:endParaRPr lang="es-MX" dirty="0"/>
-          </a:p>
-        </p:txBody>
-      </p:sp>
-    </p:spTree>
-    <p:extLst>
-      <p:ext uri="{BB962C8B-B14F-4D97-AF65-F5344CB8AC3E}">
-        <p14:creationId xmlns:p14="http://schemas.microsoft.com/office/powerpoint/2010/main" val="950616302"/>
-      </p:ext>
-    </p:extLst>
-  </p:cSld>
-  <p:clrMapOvr>
-    <a:masterClrMapping/>
-  </p:clrMapOvr>
-</p:sld>
-</file>
-
-<file path=ppt/slides/slide5.xml><?xml version="1.0" encoding="utf-8"?>
-<p:sld xmlns:a="http://schemas.openxmlformats.org/drawingml/2006/main" xmlns:r="http://schemas.openxmlformats.org/officeDocument/2006/relationships" xmlns:p="http://schemas.openxmlformats.org/presentationml/2006/main">
-  <p:cSld>
-    <p:spTree>
-      <p:nvGrpSpPr>
-        <p:cNvPr id="1" name=""/>
-        <p:cNvGrpSpPr/>
-        <p:nvPr/>
-      </p:nvGrpSpPr>
-      <p:grpSpPr>
-        <a:xfrm>
-          <a:off x="0" y="0"/>
-          <a:ext cx="0" cy="0"/>
-          <a:chOff x="0" y="0"/>
-          <a:chExt cx="0" cy="0"/>
-        </a:xfrm>
-      </p:grpSpPr>
-      <p:sp>
-        <p:nvSpPr>
-          <p:cNvPr id="2" name="Título 1">
-            <a:extLst>
-              <a:ext uri="{FF2B5EF4-FFF2-40B4-BE49-F238E27FC236}">
-                <a16:creationId xmlns:a16="http://schemas.microsoft.com/office/drawing/2014/main" id="{039A9E4D-7889-3490-92D8-D7D1CB98F7F3}"/>
-              </a:ext>
-            </a:extLst>
-          </p:cNvPr>
-          <p:cNvSpPr>
-            <a:spLocks noGrp="1"/>
-          </p:cNvSpPr>
-          <p:nvPr>
-            <p:ph type="title"/>
-          </p:nvPr>
-        </p:nvSpPr>
-        <p:spPr/>
-        <p:txBody>
-          <a:bodyPr/>
-          <a:lstStyle/>
-          <a:p>
-            <a:r>
-              <a:rPr lang="es-MX" dirty="0"/>
-              <a:t>General </a:t>
-            </a:r>
-            <a:r>
-              <a:rPr lang="es-MX" dirty="0" err="1"/>
-              <a:t>Concepts</a:t>
-            </a:r>
-            <a:endParaRPr lang="es-MX" dirty="0"/>
-          </a:p>
-        </p:txBody>
-      </p:sp>
-      <p:sp>
-        <p:nvSpPr>
-          <p:cNvPr id="3" name="Marcador de contenido 2">
-            <a:extLst>
-              <a:ext uri="{FF2B5EF4-FFF2-40B4-BE49-F238E27FC236}">
-                <a16:creationId xmlns:a16="http://schemas.microsoft.com/office/drawing/2014/main" id="{51C96787-3C54-0E42-4F41-C2125EE9B2F3}"/>
-              </a:ext>
-            </a:extLst>
-          </p:cNvPr>
-          <p:cNvSpPr>
-            <a:spLocks noGrp="1"/>
-          </p:cNvSpPr>
-          <p:nvPr>
-            <p:ph idx="1"/>
-          </p:nvPr>
-        </p:nvSpPr>
-        <p:spPr/>
-        <p:txBody>
-          <a:bodyPr>
-            <a:normAutofit fontScale="92500" lnSpcReduction="20000"/>
-          </a:bodyPr>
-          <a:lstStyle/>
-          <a:p>
-            <a:r>
-              <a:rPr lang="es-MX" b="1" dirty="0" err="1"/>
-              <a:t>Asynchronous</a:t>
-            </a:r>
-            <a:r>
-              <a:rPr lang="es-MX" dirty="0"/>
-              <a:t>:  </a:t>
-            </a:r>
-            <a:r>
-              <a:rPr lang="en-US" dirty="0"/>
-              <a:t>The idea behind asynchronous programming is that none of the threads should be waiting on an operation – that is, the framework should have the capability to wrap an operation into some abstraction and then resume once the operation is completed without blocking any threads. </a:t>
-            </a:r>
-          </a:p>
-          <a:p>
-            <a:endParaRPr lang="en-US" dirty="0"/>
-          </a:p>
-          <a:p>
-            <a:r>
-              <a:rPr lang="es-MX" b="1" dirty="0" err="1"/>
-              <a:t>Task</a:t>
-            </a:r>
-            <a:r>
-              <a:rPr lang="es-MX" dirty="0"/>
-              <a:t>: </a:t>
-            </a:r>
-            <a:r>
-              <a:rPr lang="es-MX" dirty="0" err="1"/>
-              <a:t>Is</a:t>
-            </a:r>
-            <a:r>
-              <a:rPr lang="es-MX" dirty="0"/>
-              <a:t> the </a:t>
-            </a:r>
-            <a:r>
-              <a:rPr lang="es-MX" dirty="0" err="1"/>
-              <a:t>abstraction</a:t>
-            </a:r>
-            <a:r>
-              <a:rPr lang="es-MX" dirty="0"/>
-              <a:t> </a:t>
-            </a:r>
-            <a:r>
-              <a:rPr lang="es-MX" dirty="0" err="1"/>
-              <a:t>mentioned</a:t>
-            </a:r>
-            <a:r>
-              <a:rPr lang="es-MX" dirty="0"/>
-              <a:t> </a:t>
-            </a:r>
-            <a:r>
-              <a:rPr lang="es-MX" dirty="0" err="1"/>
-              <a:t>before</a:t>
-            </a:r>
-            <a:r>
-              <a:rPr lang="es-MX" dirty="0"/>
-              <a:t>. </a:t>
-            </a:r>
-            <a:r>
-              <a:rPr lang="en-US" dirty="0"/>
-              <a:t>The Task class simplifies wrapping any wait operation, whether it is data retrieved from a database, a file being loaded into memory from disk, or any highly CPU-intensive operation, and simplifies running it on a separate thread if it is needed.</a:t>
-            </a:r>
-          </a:p>
-          <a:p>
-            <a:endParaRPr lang="es-MX" dirty="0"/>
-          </a:p>
-          <a:p>
-            <a:r>
-              <a:rPr lang="es-MX" b="1" dirty="0" err="1"/>
-              <a:t>Parallel</a:t>
-            </a:r>
-            <a:r>
-              <a:rPr lang="es-MX" dirty="0"/>
-              <a:t>: </a:t>
-            </a:r>
-            <a:r>
-              <a:rPr lang="en-US" dirty="0"/>
-              <a:t>Programming to leverage multicores or multiple processors is called parallel programming. is a subset of the broader concept of multithreading.</a:t>
-            </a:r>
-            <a:endParaRPr lang="es-MX" dirty="0"/>
-          </a:p>
-          <a:p>
-            <a:endParaRPr lang="es-MX" dirty="0"/>
-          </a:p>
-          <a:p>
-            <a:endParaRPr lang="es-MX" dirty="0"/>
-          </a:p>
-          <a:p>
-            <a:pPr marL="0" indent="0">
-              <a:buNone/>
-            </a:pPr>
-            <a:endParaRPr lang="es-MX" dirty="0"/>
-          </a:p>
-        </p:txBody>
-      </p:sp>
-    </p:spTree>
-    <p:extLst>
-      <p:ext uri="{BB962C8B-B14F-4D97-AF65-F5344CB8AC3E}">
-        <p14:creationId xmlns:p14="http://schemas.microsoft.com/office/powerpoint/2010/main" val="209537514"/>
-      </p:ext>
-    </p:extLst>
-  </p:cSld>
-  <p:clrMapOvr>
-    <a:masterClrMapping/>
-  </p:clrMapOvr>
-</p:sld>
-</file>
-
-<file path=ppt/slides/slide6.xml><?xml version="1.0" encoding="utf-8"?>
-<p:sld xmlns:a="http://schemas.openxmlformats.org/drawingml/2006/main" xmlns:r="http://schemas.openxmlformats.org/officeDocument/2006/relationships" xmlns:p="http://schemas.openxmlformats.org/presentationml/2006/main">
-  <p:cSld>
-    <p:spTree>
-      <p:nvGrpSpPr>
-        <p:cNvPr id="1" name=""/>
-        <p:cNvGrpSpPr/>
-        <p:nvPr/>
-      </p:nvGrpSpPr>
-      <p:grpSpPr>
-        <a:xfrm>
-          <a:off x="0" y="0"/>
-          <a:ext cx="0" cy="0"/>
-          <a:chOff x="0" y="0"/>
-          <a:chExt cx="0" cy="0"/>
-        </a:xfrm>
-      </p:grpSpPr>
-      <p:sp>
-        <p:nvSpPr>
-          <p:cNvPr id="2" name="Título 1">
-            <a:extLst>
-              <a:ext uri="{FF2B5EF4-FFF2-40B4-BE49-F238E27FC236}">
-                <a16:creationId xmlns:a16="http://schemas.microsoft.com/office/drawing/2014/main" id="{039A9E4D-7889-3490-92D8-D7D1CB98F7F3}"/>
-              </a:ext>
-            </a:extLst>
-          </p:cNvPr>
-          <p:cNvSpPr>
-            <a:spLocks noGrp="1"/>
-          </p:cNvSpPr>
-          <p:nvPr>
-            <p:ph type="title"/>
-          </p:nvPr>
-        </p:nvSpPr>
-        <p:spPr/>
-        <p:txBody>
-          <a:bodyPr/>
-          <a:lstStyle/>
-          <a:p>
-            <a:r>
-              <a:rPr lang="es-MX" dirty="0" err="1"/>
-              <a:t>Why</a:t>
-            </a:r>
-            <a:r>
-              <a:rPr lang="es-MX" dirty="0"/>
-              <a:t> </a:t>
-            </a:r>
-            <a:r>
-              <a:rPr lang="es-MX" dirty="0" err="1"/>
-              <a:t>multithread</a:t>
-            </a:r>
-            <a:r>
-              <a:rPr lang="es-MX" dirty="0"/>
-              <a:t>, multitask, </a:t>
-            </a:r>
-            <a:r>
-              <a:rPr lang="es-MX" dirty="0" err="1"/>
-              <a:t>async</a:t>
-            </a:r>
-            <a:r>
-              <a:rPr lang="es-MX" dirty="0"/>
-              <a:t> </a:t>
-            </a:r>
-            <a:r>
-              <a:rPr lang="es-MX" dirty="0" err="1"/>
-              <a:t>or</a:t>
-            </a:r>
-            <a:r>
-              <a:rPr lang="es-MX" dirty="0"/>
-              <a:t> </a:t>
-            </a:r>
-            <a:r>
-              <a:rPr lang="es-MX" dirty="0" err="1"/>
-              <a:t>parallel</a:t>
-            </a:r>
-            <a:r>
-              <a:rPr lang="es-MX" dirty="0"/>
-              <a:t>?</a:t>
-            </a:r>
-          </a:p>
-        </p:txBody>
-      </p:sp>
-      <p:sp>
-        <p:nvSpPr>
-          <p:cNvPr id="3" name="Marcador de contenido 2">
-            <a:extLst>
-              <a:ext uri="{FF2B5EF4-FFF2-40B4-BE49-F238E27FC236}">
-                <a16:creationId xmlns:a16="http://schemas.microsoft.com/office/drawing/2014/main" id="{51C96787-3C54-0E42-4F41-C2125EE9B2F3}"/>
-              </a:ext>
-            </a:extLst>
-          </p:cNvPr>
-          <p:cNvSpPr>
-            <a:spLocks noGrp="1"/>
-          </p:cNvSpPr>
-          <p:nvPr>
-            <p:ph idx="1"/>
-          </p:nvPr>
-        </p:nvSpPr>
-        <p:spPr/>
-        <p:txBody>
-          <a:bodyPr>
-            <a:normAutofit/>
-          </a:bodyPr>
-          <a:lstStyle/>
-          <a:p>
-            <a:r>
-              <a:rPr lang="en-US" b="1" dirty="0"/>
-              <a:t>To improve responsiveness: </a:t>
-            </a:r>
-            <a:r>
-              <a:rPr lang="en-US" dirty="0"/>
-              <a:t>A long-running operation might involve tasks that don’t require processor time. it doesn’t make sense to have a program burn CPU cycles waiting for the operation to complete when the program could be doing something more useful instead, such as responding to user input. </a:t>
-            </a:r>
-            <a:br>
-              <a:rPr lang="en-US" dirty="0"/>
-            </a:br>
-            <a:br>
-              <a:rPr lang="en-US" dirty="0"/>
-            </a:br>
-            <a:r>
-              <a:rPr lang="en-US" b="1" dirty="0"/>
-              <a:t>To improve scalability: </a:t>
-            </a:r>
-            <a:r>
-              <a:rPr lang="en-US" dirty="0"/>
-              <a:t>If an operation is CPU bound, you can improve scalability by making efficient use of available processing resources and using these resources to reduce the time required to execute the operation. A developer can determine which operations include tasks that can</a:t>
-            </a:r>
-            <a:endParaRPr lang="es-MX" dirty="0"/>
-          </a:p>
-          <a:p>
-            <a:endParaRPr lang="es-MX" dirty="0"/>
-          </a:p>
-          <a:p>
-            <a:pPr marL="0" indent="0">
-              <a:buNone/>
-            </a:pPr>
-            <a:endParaRPr lang="es-MX" dirty="0"/>
-          </a:p>
-        </p:txBody>
-      </p:sp>
-    </p:spTree>
-    <p:extLst>
-      <p:ext uri="{BB962C8B-B14F-4D97-AF65-F5344CB8AC3E}">
-        <p14:creationId xmlns:p14="http://schemas.microsoft.com/office/powerpoint/2010/main" val="1339158806"/>
-      </p:ext>
-    </p:extLst>
-  </p:cSld>
-  <p:clrMapOvr>
-    <a:masterClrMapping/>
-  </p:clrMapOvr>
-</p:sld>
-</file>
-
-<file path=ppt/slides/slide7.xml><?xml version="1.0" encoding="utf-8"?>
-<p:sld xmlns:a="http://schemas.openxmlformats.org/drawingml/2006/main" xmlns:r="http://schemas.openxmlformats.org/officeDocument/2006/relationships" xmlns:p="http://schemas.openxmlformats.org/presentationml/2006/main">
-  <p:cSld>
-    <p:spTree>
-      <p:nvGrpSpPr>
-        <p:cNvPr id="1" name=""/>
-        <p:cNvGrpSpPr/>
-        <p:nvPr/>
-      </p:nvGrpSpPr>
-      <p:grpSpPr>
-        <a:xfrm>
-          <a:off x="0" y="0"/>
-          <a:ext cx="0" cy="0"/>
-          <a:chOff x="0" y="0"/>
-          <a:chExt cx="0" cy="0"/>
-        </a:xfrm>
-      </p:grpSpPr>
-      <p:sp>
-        <p:nvSpPr>
-          <p:cNvPr id="2" name="Título 1">
-            <a:extLst>
-              <a:ext uri="{FF2B5EF4-FFF2-40B4-BE49-F238E27FC236}">
-                <a16:creationId xmlns:a16="http://schemas.microsoft.com/office/drawing/2014/main" id="{039A9E4D-7889-3490-92D8-D7D1CB98F7F3}"/>
-              </a:ext>
-            </a:extLst>
-          </p:cNvPr>
-          <p:cNvSpPr>
-            <a:spLocks noGrp="1"/>
-          </p:cNvSpPr>
-          <p:nvPr>
-            <p:ph type="title"/>
-          </p:nvPr>
-        </p:nvSpPr>
-        <p:spPr/>
-        <p:txBody>
-          <a:bodyPr/>
-          <a:lstStyle/>
-          <a:p>
-            <a:r>
-              <a:rPr lang="es-MX" dirty="0"/>
-              <a:t>C# </a:t>
-            </a:r>
-            <a:r>
-              <a:rPr lang="es-MX" dirty="0" err="1"/>
-              <a:t>Implementation</a:t>
-            </a:r>
-            <a:r>
-              <a:rPr lang="es-MX" dirty="0"/>
-              <a:t> </a:t>
-            </a:r>
-            <a:r>
-              <a:rPr lang="es-MX" dirty="0" err="1"/>
-              <a:t>Options</a:t>
-            </a:r>
-            <a:endParaRPr lang="es-MX" dirty="0"/>
-          </a:p>
-        </p:txBody>
-      </p:sp>
-      <p:sp>
-        <p:nvSpPr>
-          <p:cNvPr id="3" name="Marcador de contenido 2">
-            <a:extLst>
-              <a:ext uri="{FF2B5EF4-FFF2-40B4-BE49-F238E27FC236}">
-                <a16:creationId xmlns:a16="http://schemas.microsoft.com/office/drawing/2014/main" id="{51C96787-3C54-0E42-4F41-C2125EE9B2F3}"/>
-              </a:ext>
-            </a:extLst>
-          </p:cNvPr>
-          <p:cNvSpPr>
-            <a:spLocks noGrp="1"/>
-          </p:cNvSpPr>
-          <p:nvPr>
-            <p:ph idx="1"/>
-          </p:nvPr>
-        </p:nvSpPr>
-        <p:spPr/>
-        <p:txBody>
-          <a:bodyPr/>
-          <a:lstStyle/>
-          <a:p>
-            <a:r>
-              <a:rPr lang="es-MX" dirty="0" err="1"/>
-              <a:t>Thread</a:t>
-            </a:r>
-            <a:r>
-              <a:rPr lang="es-MX" dirty="0"/>
-              <a:t>, </a:t>
-            </a:r>
-            <a:r>
-              <a:rPr lang="es-MX" dirty="0" err="1"/>
-              <a:t>ThreadPool</a:t>
-            </a:r>
-            <a:endParaRPr lang="es-MX" dirty="0"/>
-          </a:p>
-          <a:p>
-            <a:r>
-              <a:rPr lang="es-MX" dirty="0" err="1"/>
-              <a:t>Dispatcher</a:t>
-            </a:r>
-            <a:r>
-              <a:rPr lang="es-MX" dirty="0"/>
-              <a:t>, </a:t>
-            </a:r>
-            <a:r>
-              <a:rPr lang="es-MX" dirty="0" err="1"/>
-              <a:t>Backgroundworker</a:t>
-            </a:r>
-            <a:endParaRPr lang="es-MX" dirty="0"/>
-          </a:p>
-          <a:p>
-            <a:r>
-              <a:rPr lang="es-MX" dirty="0" err="1"/>
-              <a:t>Task</a:t>
-            </a:r>
-            <a:r>
-              <a:rPr lang="es-MX" dirty="0"/>
-              <a:t> (TPL)</a:t>
-            </a:r>
-          </a:p>
-          <a:p>
-            <a:r>
-              <a:rPr lang="es-MX" dirty="0" err="1"/>
-              <a:t>Async</a:t>
-            </a:r>
-            <a:r>
-              <a:rPr lang="es-MX" dirty="0"/>
-              <a:t> </a:t>
-            </a:r>
-            <a:r>
-              <a:rPr lang="es-MX" dirty="0" err="1"/>
-              <a:t>await</a:t>
-            </a:r>
-            <a:endParaRPr lang="es-MX" dirty="0"/>
-          </a:p>
-          <a:p>
-            <a:r>
-              <a:rPr lang="es-MX" dirty="0"/>
-              <a:t>PFX, PLINQ</a:t>
-            </a:r>
-          </a:p>
-          <a:p>
-            <a:endParaRPr lang="es-MX" dirty="0"/>
-          </a:p>
-          <a:p>
-            <a:endParaRPr lang="es-MX" dirty="0"/>
-          </a:p>
-          <a:p>
-            <a:endParaRPr lang="es-MX" dirty="0"/>
-          </a:p>
-          <a:p>
-            <a:pPr marL="0" indent="0">
-              <a:buNone/>
-            </a:pPr>
-            <a:endParaRPr lang="es-MX" dirty="0"/>
-          </a:p>
-        </p:txBody>
-      </p:sp>
-    </p:spTree>
-    <p:extLst>
-      <p:ext uri="{BB962C8B-B14F-4D97-AF65-F5344CB8AC3E}">
-        <p14:creationId xmlns:p14="http://schemas.microsoft.com/office/powerpoint/2010/main" val="3508183269"/>
-      </p:ext>
-    </p:extLst>
-  </p:cSld>
-  <p:clrMapOvr>
-    <a:masterClrMapping/>
-  </p:clrMapOvr>
-</p:sld>
-</file>
-
-<file path=ppt/slides/slide8.xml><?xml version="1.0" encoding="utf-8"?>
-<p:sld xmlns:a="http://schemas.openxmlformats.org/drawingml/2006/main" xmlns:r="http://schemas.openxmlformats.org/officeDocument/2006/relationships" xmlns:p="http://schemas.openxmlformats.org/presentationml/2006/main">
-  <p:cSld>
-    <p:spTree>
-      <p:nvGrpSpPr>
-        <p:cNvPr id="1" name=""/>
-        <p:cNvGrpSpPr/>
-        <p:nvPr/>
-      </p:nvGrpSpPr>
-      <p:grpSpPr>
-        <a:xfrm>
-          <a:off x="0" y="0"/>
-          <a:ext cx="0" cy="0"/>
-          <a:chOff x="0" y="0"/>
-          <a:chExt cx="0" cy="0"/>
-        </a:xfrm>
-      </p:grpSpPr>
-      <p:sp>
-        <p:nvSpPr>
-          <p:cNvPr id="2" name="Título 1">
-            <a:extLst>
-              <a:ext uri="{FF2B5EF4-FFF2-40B4-BE49-F238E27FC236}">
-                <a16:creationId xmlns:a16="http://schemas.microsoft.com/office/drawing/2014/main" id="{422D584E-DFA6-504A-DF09-FB6C1BED9CDB}"/>
-              </a:ext>
-            </a:extLst>
-          </p:cNvPr>
-          <p:cNvSpPr>
-            <a:spLocks noGrp="1"/>
-          </p:cNvSpPr>
-          <p:nvPr>
-            <p:ph type="ctrTitle"/>
-          </p:nvPr>
-        </p:nvSpPr>
-        <p:spPr/>
-        <p:txBody>
-          <a:bodyPr/>
-          <a:lstStyle/>
-          <a:p>
-            <a:r>
-              <a:rPr lang="es-MX" dirty="0" err="1"/>
-              <a:t>Code</a:t>
-            </a:r>
-            <a:r>
-              <a:rPr lang="es-MX" dirty="0"/>
-              <a:t> Time  </a:t>
-            </a:r>
-            <a:r>
-              <a:rPr lang="es-MX" dirty="0">
-                <a:sym typeface="Wingdings" panose="05000000000000000000" pitchFamily="2" charset="2"/>
-              </a:rPr>
-              <a:t></a:t>
-            </a:r>
-            <a:r>
-              <a:rPr lang="es-MX" dirty="0"/>
-              <a:t> </a:t>
-            </a:r>
-          </a:p>
-        </p:txBody>
-      </p:sp>
-      <p:sp>
-        <p:nvSpPr>
-          <p:cNvPr id="3" name="Subtítulo 2">
-            <a:extLst>
-              <a:ext uri="{FF2B5EF4-FFF2-40B4-BE49-F238E27FC236}">
-                <a16:creationId xmlns:a16="http://schemas.microsoft.com/office/drawing/2014/main" id="{27B5A0C9-730A-34D7-9FB5-BFF412D917CE}"/>
-              </a:ext>
-            </a:extLst>
-          </p:cNvPr>
-          <p:cNvSpPr>
-            <a:spLocks noGrp="1"/>
-          </p:cNvSpPr>
-          <p:nvPr>
-            <p:ph type="subTitle" idx="1"/>
-          </p:nvPr>
-        </p:nvSpPr>
-        <p:spPr/>
-        <p:txBody>
-          <a:bodyPr/>
-          <a:lstStyle/>
-          <a:p>
-            <a:endParaRPr lang="es-MX" dirty="0"/>
-          </a:p>
-        </p:txBody>
-      </p:sp>
-    </p:spTree>
-    <p:extLst>
-      <p:ext uri="{BB962C8B-B14F-4D97-AF65-F5344CB8AC3E}">
-        <p14:creationId xmlns:p14="http://schemas.microsoft.com/office/powerpoint/2010/main" val="3142671275"/>
-      </p:ext>
-    </p:extLst>
-  </p:cSld>
-  <p:clrMapOvr>
-    <a:masterClrMapping/>
-  </p:clrMapOvr>
-</p:sld>
-</file>
-
-<file path=ppt/slides/slide9.xml><?xml version="1.0" encoding="utf-8"?>
-<p:sld xmlns:a="http://schemas.openxmlformats.org/drawingml/2006/main" xmlns:r="http://schemas.openxmlformats.org/officeDocument/2006/relationships" xmlns:p="http://schemas.openxmlformats.org/presentationml/2006/main">
-  <p:cSld>
     <p:bg>
       <p:bgPr>
         <a:blipFill rotWithShape="1">
@@ -8583,6 +7247,1606 @@
     <p:extLst>
       <p:ext uri="{BB962C8B-B14F-4D97-AF65-F5344CB8AC3E}">
         <p14:creationId xmlns:p14="http://schemas.microsoft.com/office/powerpoint/2010/main" val="510767980"/>
+      </p:ext>
+    </p:extLst>
+  </p:cSld>
+  <p:clrMapOvr>
+    <a:masterClrMapping/>
+  </p:clrMapOvr>
+</p:sld>
+</file>
+
+<file path=ppt/slides/slide11.xml><?xml version="1.0" encoding="utf-8"?>
+<p:sld xmlns:a="http://schemas.openxmlformats.org/drawingml/2006/main" xmlns:r="http://schemas.openxmlformats.org/officeDocument/2006/relationships" xmlns:p="http://schemas.openxmlformats.org/presentationml/2006/main">
+  <p:cSld>
+    <p:spTree>
+      <p:nvGrpSpPr>
+        <p:cNvPr id="1" name=""/>
+        <p:cNvGrpSpPr/>
+        <p:nvPr/>
+      </p:nvGrpSpPr>
+      <p:grpSpPr>
+        <a:xfrm>
+          <a:off x="0" y="0"/>
+          <a:ext cx="0" cy="0"/>
+          <a:chOff x="0" y="0"/>
+          <a:chExt cx="0" cy="0"/>
+        </a:xfrm>
+      </p:grpSpPr>
+      <p:sp>
+        <p:nvSpPr>
+          <p:cNvPr id="2" name="Título 1">
+            <a:extLst>
+              <a:ext uri="{FF2B5EF4-FFF2-40B4-BE49-F238E27FC236}">
+                <a16:creationId xmlns:a16="http://schemas.microsoft.com/office/drawing/2014/main" id="{96B4C46F-1726-872F-0A81-A010DB66C17A}"/>
+              </a:ext>
+            </a:extLst>
+          </p:cNvPr>
+          <p:cNvSpPr>
+            <a:spLocks noGrp="1"/>
+          </p:cNvSpPr>
+          <p:nvPr>
+            <p:ph type="ctrTitle"/>
+          </p:nvPr>
+        </p:nvSpPr>
+        <p:spPr/>
+        <p:txBody>
+          <a:bodyPr/>
+          <a:lstStyle/>
+          <a:p>
+            <a:r>
+              <a:rPr lang="es-MX" dirty="0" err="1"/>
+              <a:t>Questions</a:t>
+            </a:r>
+            <a:r>
+              <a:rPr lang="es-MX" dirty="0"/>
+              <a:t>?</a:t>
+            </a:r>
+          </a:p>
+        </p:txBody>
+      </p:sp>
+      <p:sp>
+        <p:nvSpPr>
+          <p:cNvPr id="3" name="Subtítulo 2">
+            <a:extLst>
+              <a:ext uri="{FF2B5EF4-FFF2-40B4-BE49-F238E27FC236}">
+                <a16:creationId xmlns:a16="http://schemas.microsoft.com/office/drawing/2014/main" id="{8AD2D9DC-7BDC-2AA1-C359-F61BDC156A1F}"/>
+              </a:ext>
+            </a:extLst>
+          </p:cNvPr>
+          <p:cNvSpPr>
+            <a:spLocks noGrp="1"/>
+          </p:cNvSpPr>
+          <p:nvPr>
+            <p:ph type="subTitle" idx="1"/>
+          </p:nvPr>
+        </p:nvSpPr>
+        <p:spPr/>
+        <p:txBody>
+          <a:bodyPr/>
+          <a:lstStyle/>
+          <a:p>
+            <a:endParaRPr lang="es-MX" dirty="0"/>
+          </a:p>
+        </p:txBody>
+      </p:sp>
+    </p:spTree>
+    <p:extLst>
+      <p:ext uri="{BB962C8B-B14F-4D97-AF65-F5344CB8AC3E}">
+        <p14:creationId xmlns:p14="http://schemas.microsoft.com/office/powerpoint/2010/main" val="4191166655"/>
+      </p:ext>
+    </p:extLst>
+  </p:cSld>
+  <p:clrMapOvr>
+    <a:masterClrMapping/>
+  </p:clrMapOvr>
+</p:sld>
+</file>
+
+<file path=ppt/slides/slide2.xml><?xml version="1.0" encoding="utf-8"?>
+<p:sld xmlns:a="http://schemas.openxmlformats.org/drawingml/2006/main" xmlns:r="http://schemas.openxmlformats.org/officeDocument/2006/relationships" xmlns:p="http://schemas.openxmlformats.org/presentationml/2006/main">
+  <p:cSld>
+    <p:spTree>
+      <p:nvGrpSpPr>
+        <p:cNvPr id="1" name=""/>
+        <p:cNvGrpSpPr/>
+        <p:nvPr/>
+      </p:nvGrpSpPr>
+      <p:grpSpPr>
+        <a:xfrm>
+          <a:off x="0" y="0"/>
+          <a:ext cx="0" cy="0"/>
+          <a:chOff x="0" y="0"/>
+          <a:chExt cx="0" cy="0"/>
+        </a:xfrm>
+      </p:grpSpPr>
+      <p:sp>
+        <p:nvSpPr>
+          <p:cNvPr id="2" name="Título 1">
+            <a:extLst>
+              <a:ext uri="{FF2B5EF4-FFF2-40B4-BE49-F238E27FC236}">
+                <a16:creationId xmlns:a16="http://schemas.microsoft.com/office/drawing/2014/main" id="{039A9E4D-7889-3490-92D8-D7D1CB98F7F3}"/>
+              </a:ext>
+            </a:extLst>
+          </p:cNvPr>
+          <p:cNvSpPr>
+            <a:spLocks noGrp="1"/>
+          </p:cNvSpPr>
+          <p:nvPr>
+            <p:ph type="title"/>
+          </p:nvPr>
+        </p:nvSpPr>
+        <p:spPr/>
+        <p:txBody>
+          <a:bodyPr/>
+          <a:lstStyle/>
+          <a:p>
+            <a:r>
+              <a:rPr lang="es-MX" dirty="0" err="1"/>
+              <a:t>About</a:t>
+            </a:r>
+            <a:r>
+              <a:rPr lang="es-MX" dirty="0"/>
+              <a:t> me</a:t>
+            </a:r>
+          </a:p>
+        </p:txBody>
+      </p:sp>
+      <p:sp>
+        <p:nvSpPr>
+          <p:cNvPr id="3" name="Marcador de contenido 2">
+            <a:extLst>
+              <a:ext uri="{FF2B5EF4-FFF2-40B4-BE49-F238E27FC236}">
+                <a16:creationId xmlns:a16="http://schemas.microsoft.com/office/drawing/2014/main" id="{51C96787-3C54-0E42-4F41-C2125EE9B2F3}"/>
+              </a:ext>
+            </a:extLst>
+          </p:cNvPr>
+          <p:cNvSpPr>
+            <a:spLocks noGrp="1"/>
+          </p:cNvSpPr>
+          <p:nvPr>
+            <p:ph idx="1"/>
+          </p:nvPr>
+        </p:nvSpPr>
+        <p:spPr/>
+        <p:txBody>
+          <a:bodyPr>
+            <a:normAutofit lnSpcReduction="10000"/>
+          </a:bodyPr>
+          <a:lstStyle/>
+          <a:p>
+            <a:r>
+              <a:rPr lang="es-MX" dirty="0" err="1"/>
+              <a:t>I’m</a:t>
+            </a:r>
+            <a:r>
+              <a:rPr lang="es-MX" dirty="0"/>
+              <a:t> </a:t>
+            </a:r>
+            <a:r>
+              <a:rPr lang="es-MX" dirty="0" err="1"/>
+              <a:t>Mexican</a:t>
+            </a:r>
+            <a:endParaRPr lang="es-MX" dirty="0"/>
+          </a:p>
+          <a:p>
+            <a:r>
+              <a:rPr lang="es-MX" dirty="0" err="1"/>
+              <a:t>Married</a:t>
+            </a:r>
+            <a:r>
+              <a:rPr lang="es-MX" dirty="0"/>
+              <a:t> </a:t>
+            </a:r>
+            <a:r>
+              <a:rPr lang="es-MX" dirty="0" err="1"/>
+              <a:t>with</a:t>
+            </a:r>
+            <a:r>
+              <a:rPr lang="es-MX" dirty="0"/>
+              <a:t> </a:t>
+            </a:r>
+            <a:r>
+              <a:rPr lang="es-MX" dirty="0" err="1"/>
+              <a:t>only</a:t>
+            </a:r>
+            <a:r>
+              <a:rPr lang="es-MX" dirty="0"/>
+              <a:t> </a:t>
+            </a:r>
+            <a:r>
+              <a:rPr lang="es-MX" dirty="0" err="1"/>
+              <a:t>one</a:t>
+            </a:r>
+            <a:r>
+              <a:rPr lang="es-MX" dirty="0"/>
+              <a:t> </a:t>
+            </a:r>
+            <a:r>
+              <a:rPr lang="es-MX" dirty="0" err="1"/>
+              <a:t>daughter</a:t>
+            </a:r>
+            <a:r>
+              <a:rPr lang="es-MX" dirty="0"/>
+              <a:t> </a:t>
+            </a:r>
+          </a:p>
+          <a:p>
+            <a:r>
+              <a:rPr lang="es-MX" dirty="0"/>
+              <a:t>.NET </a:t>
+            </a:r>
+            <a:r>
+              <a:rPr lang="es-MX" dirty="0" err="1"/>
+              <a:t>Developer</a:t>
+            </a:r>
+            <a:r>
+              <a:rPr lang="es-MX" dirty="0"/>
+              <a:t> </a:t>
+            </a:r>
+            <a:r>
+              <a:rPr lang="es-MX" dirty="0" err="1"/>
+              <a:t>for</a:t>
+            </a:r>
+            <a:r>
+              <a:rPr lang="es-MX" dirty="0"/>
+              <a:t> so </a:t>
+            </a:r>
+            <a:r>
+              <a:rPr lang="es-MX" dirty="0" err="1"/>
+              <a:t>long</a:t>
+            </a:r>
+            <a:r>
+              <a:rPr lang="es-MX" dirty="0"/>
+              <a:t> time</a:t>
+            </a:r>
+          </a:p>
+          <a:p>
+            <a:r>
+              <a:rPr lang="es-MX" dirty="0"/>
+              <a:t>Full </a:t>
+            </a:r>
+            <a:r>
+              <a:rPr lang="es-MX" dirty="0" err="1"/>
+              <a:t>stack</a:t>
+            </a:r>
+            <a:r>
+              <a:rPr lang="es-MX" dirty="0"/>
+              <a:t> Web </a:t>
+            </a:r>
+            <a:r>
+              <a:rPr lang="es-MX" dirty="0" err="1"/>
+              <a:t>Developer</a:t>
+            </a:r>
+            <a:r>
+              <a:rPr lang="es-MX" dirty="0"/>
+              <a:t> (Angular, </a:t>
+            </a:r>
+            <a:r>
+              <a:rPr lang="es-MX" dirty="0" err="1"/>
+              <a:t>React</a:t>
+            </a:r>
+            <a:r>
+              <a:rPr lang="es-MX" dirty="0"/>
+              <a:t>)</a:t>
+            </a:r>
+          </a:p>
+          <a:p>
+            <a:r>
+              <a:rPr lang="es-MX" dirty="0" err="1"/>
+              <a:t>Currently</a:t>
+            </a:r>
+            <a:r>
+              <a:rPr lang="es-MX" dirty="0"/>
+              <a:t> Senior Middleware </a:t>
+            </a:r>
+            <a:r>
+              <a:rPr lang="es-MX" dirty="0" err="1"/>
+              <a:t>Developer</a:t>
+            </a:r>
+            <a:r>
+              <a:rPr lang="es-MX" dirty="0"/>
+              <a:t> in Chamberlain </a:t>
+            </a:r>
+            <a:r>
+              <a:rPr lang="es-MX" dirty="0" err="1"/>
+              <a:t>project</a:t>
+            </a:r>
+            <a:endParaRPr lang="es-MX" dirty="0"/>
+          </a:p>
+          <a:p>
+            <a:r>
+              <a:rPr lang="es-MX" dirty="0"/>
+              <a:t>Regular </a:t>
+            </a:r>
+            <a:r>
+              <a:rPr lang="es-MX" dirty="0" err="1"/>
+              <a:t>posting</a:t>
+            </a:r>
+            <a:r>
+              <a:rPr lang="es-MX" dirty="0"/>
+              <a:t> in .NET </a:t>
+            </a:r>
+            <a:r>
+              <a:rPr lang="es-MX" dirty="0" err="1"/>
+              <a:t>Chapter</a:t>
+            </a:r>
+            <a:r>
+              <a:rPr lang="es-MX" dirty="0"/>
+              <a:t> </a:t>
+            </a:r>
+            <a:r>
+              <a:rPr lang="es-MX" dirty="0" err="1"/>
+              <a:t>Community</a:t>
+            </a:r>
+            <a:r>
+              <a:rPr lang="es-MX" dirty="0"/>
+              <a:t> in </a:t>
+            </a:r>
+            <a:r>
+              <a:rPr lang="es-MX" dirty="0" err="1"/>
+              <a:t>Workplace</a:t>
+            </a:r>
+            <a:endParaRPr lang="es-MX" dirty="0"/>
+          </a:p>
+          <a:p>
+            <a:r>
+              <a:rPr lang="es-MX" dirty="0"/>
+              <a:t>Data </a:t>
+            </a:r>
+            <a:r>
+              <a:rPr lang="es-MX" dirty="0" err="1"/>
+              <a:t>scientist</a:t>
+            </a:r>
+            <a:r>
+              <a:rPr lang="es-MX" dirty="0"/>
+              <a:t> </a:t>
+            </a:r>
+            <a:r>
+              <a:rPr lang="es-MX" dirty="0" err="1"/>
+              <a:t>newbie</a:t>
+            </a:r>
+            <a:endParaRPr lang="es-MX" dirty="0"/>
+          </a:p>
+          <a:p>
+            <a:endParaRPr lang="es-MX" dirty="0"/>
+          </a:p>
+          <a:p>
+            <a:endParaRPr lang="es-MX" dirty="0"/>
+          </a:p>
+          <a:p>
+            <a:pPr marL="0" indent="0">
+              <a:buNone/>
+            </a:pPr>
+            <a:r>
+              <a:rPr lang="es-MX" dirty="0"/>
+              <a:t>Twitter  LinkedIn GitHub @dacanetdev </a:t>
+            </a:r>
+          </a:p>
+        </p:txBody>
+      </p:sp>
+    </p:spTree>
+    <p:extLst>
+      <p:ext uri="{BB962C8B-B14F-4D97-AF65-F5344CB8AC3E}">
+        <p14:creationId xmlns:p14="http://schemas.microsoft.com/office/powerpoint/2010/main" val="1551156344"/>
+      </p:ext>
+    </p:extLst>
+  </p:cSld>
+  <p:clrMapOvr>
+    <a:masterClrMapping/>
+  </p:clrMapOvr>
+</p:sld>
+</file>
+
+<file path=ppt/slides/slide3.xml><?xml version="1.0" encoding="utf-8"?>
+<p:sld xmlns:a="http://schemas.openxmlformats.org/drawingml/2006/main" xmlns:r="http://schemas.openxmlformats.org/officeDocument/2006/relationships" xmlns:p="http://schemas.openxmlformats.org/presentationml/2006/main">
+  <p:cSld>
+    <p:spTree>
+      <p:nvGrpSpPr>
+        <p:cNvPr id="1" name=""/>
+        <p:cNvGrpSpPr/>
+        <p:nvPr/>
+      </p:nvGrpSpPr>
+      <p:grpSpPr>
+        <a:xfrm>
+          <a:off x="0" y="0"/>
+          <a:ext cx="0" cy="0"/>
+          <a:chOff x="0" y="0"/>
+          <a:chExt cx="0" cy="0"/>
+        </a:xfrm>
+      </p:grpSpPr>
+      <p:sp>
+        <p:nvSpPr>
+          <p:cNvPr id="2" name="Título 1">
+            <a:extLst>
+              <a:ext uri="{FF2B5EF4-FFF2-40B4-BE49-F238E27FC236}">
+                <a16:creationId xmlns:a16="http://schemas.microsoft.com/office/drawing/2014/main" id="{039A9E4D-7889-3490-92D8-D7D1CB98F7F3}"/>
+              </a:ext>
+            </a:extLst>
+          </p:cNvPr>
+          <p:cNvSpPr>
+            <a:spLocks noGrp="1"/>
+          </p:cNvSpPr>
+          <p:nvPr>
+            <p:ph type="title"/>
+          </p:nvPr>
+        </p:nvSpPr>
+        <p:spPr/>
+        <p:txBody>
+          <a:bodyPr/>
+          <a:lstStyle/>
+          <a:p>
+            <a:r>
+              <a:rPr lang="es-MX" dirty="0"/>
+              <a:t>Agenda</a:t>
+            </a:r>
+          </a:p>
+        </p:txBody>
+      </p:sp>
+      <p:sp>
+        <p:nvSpPr>
+          <p:cNvPr id="3" name="Marcador de contenido 2">
+            <a:extLst>
+              <a:ext uri="{FF2B5EF4-FFF2-40B4-BE49-F238E27FC236}">
+                <a16:creationId xmlns:a16="http://schemas.microsoft.com/office/drawing/2014/main" id="{51C96787-3C54-0E42-4F41-C2125EE9B2F3}"/>
+              </a:ext>
+            </a:extLst>
+          </p:cNvPr>
+          <p:cNvSpPr>
+            <a:spLocks noGrp="1"/>
+          </p:cNvSpPr>
+          <p:nvPr>
+            <p:ph idx="1"/>
+          </p:nvPr>
+        </p:nvSpPr>
+        <p:spPr/>
+        <p:txBody>
+          <a:bodyPr/>
+          <a:lstStyle/>
+          <a:p>
+            <a:r>
+              <a:rPr lang="es-MX" dirty="0"/>
+              <a:t>General </a:t>
+            </a:r>
+            <a:r>
+              <a:rPr lang="es-MX" dirty="0" err="1"/>
+              <a:t>Concepts</a:t>
+            </a:r>
+            <a:endParaRPr lang="es-MX" dirty="0"/>
+          </a:p>
+          <a:p>
+            <a:r>
+              <a:rPr lang="es-MX" dirty="0" err="1"/>
+              <a:t>Why</a:t>
+            </a:r>
+            <a:r>
+              <a:rPr lang="es-MX" dirty="0"/>
+              <a:t> multitasking </a:t>
+            </a:r>
+            <a:r>
+              <a:rPr lang="es-MX" dirty="0" err="1"/>
+              <a:t>or</a:t>
+            </a:r>
+            <a:r>
+              <a:rPr lang="es-MX" dirty="0"/>
+              <a:t> </a:t>
+            </a:r>
+            <a:r>
+              <a:rPr lang="es-MX" dirty="0" err="1"/>
+              <a:t>parallel</a:t>
+            </a:r>
+            <a:r>
+              <a:rPr lang="es-MX" dirty="0"/>
+              <a:t>?</a:t>
+            </a:r>
+          </a:p>
+          <a:p>
+            <a:r>
+              <a:rPr lang="es-MX" dirty="0"/>
+              <a:t>C# </a:t>
+            </a:r>
+            <a:r>
+              <a:rPr lang="es-MX" dirty="0" err="1"/>
+              <a:t>Implementation</a:t>
+            </a:r>
+            <a:r>
+              <a:rPr lang="es-MX" dirty="0"/>
+              <a:t> </a:t>
+            </a:r>
+            <a:r>
+              <a:rPr lang="es-MX" dirty="0" err="1"/>
+              <a:t>options</a:t>
+            </a:r>
+            <a:endParaRPr lang="es-MX" dirty="0"/>
+          </a:p>
+          <a:p>
+            <a:r>
+              <a:rPr lang="es-MX" dirty="0" err="1"/>
+              <a:t>Measuring</a:t>
+            </a:r>
+            <a:r>
+              <a:rPr lang="es-MX" dirty="0"/>
+              <a:t> Performance</a:t>
+            </a:r>
+          </a:p>
+          <a:p>
+            <a:r>
+              <a:rPr lang="es-MX" dirty="0"/>
+              <a:t>C# </a:t>
+            </a:r>
+            <a:r>
+              <a:rPr lang="es-MX" dirty="0" err="1"/>
+              <a:t>solutions</a:t>
+            </a:r>
+            <a:r>
+              <a:rPr lang="es-MX" dirty="0"/>
+              <a:t> (</a:t>
+            </a:r>
+            <a:r>
+              <a:rPr lang="es-MX" dirty="0" err="1"/>
+              <a:t>with</a:t>
+            </a:r>
+            <a:r>
+              <a:rPr lang="es-MX" dirty="0"/>
+              <a:t> </a:t>
+            </a:r>
+            <a:r>
+              <a:rPr lang="es-MX" dirty="0" err="1"/>
+              <a:t>code</a:t>
+            </a:r>
+            <a:r>
+              <a:rPr lang="es-MX" dirty="0"/>
+              <a:t> </a:t>
+            </a:r>
+            <a:r>
+              <a:rPr lang="es-MX" dirty="0" err="1"/>
+              <a:t>examples</a:t>
+            </a:r>
+            <a:r>
+              <a:rPr lang="es-MX" dirty="0"/>
+              <a:t>)</a:t>
+            </a:r>
+          </a:p>
+          <a:p>
+            <a:r>
+              <a:rPr lang="es-MX" dirty="0"/>
+              <a:t>Q &amp; A</a:t>
+            </a:r>
+          </a:p>
+          <a:p>
+            <a:endParaRPr lang="es-MX" dirty="0"/>
+          </a:p>
+          <a:p>
+            <a:endParaRPr lang="es-MX" dirty="0"/>
+          </a:p>
+          <a:p>
+            <a:endParaRPr lang="es-MX" dirty="0"/>
+          </a:p>
+          <a:p>
+            <a:pPr marL="0" indent="0">
+              <a:buNone/>
+            </a:pPr>
+            <a:endParaRPr lang="es-MX" dirty="0"/>
+          </a:p>
+        </p:txBody>
+      </p:sp>
+    </p:spTree>
+    <p:extLst>
+      <p:ext uri="{BB962C8B-B14F-4D97-AF65-F5344CB8AC3E}">
+        <p14:creationId xmlns:p14="http://schemas.microsoft.com/office/powerpoint/2010/main" val="661867213"/>
+      </p:ext>
+    </p:extLst>
+  </p:cSld>
+  <p:clrMapOvr>
+    <a:masterClrMapping/>
+  </p:clrMapOvr>
+</p:sld>
+</file>
+
+<file path=ppt/slides/slide4.xml><?xml version="1.0" encoding="utf-8"?>
+<p:sld xmlns:a="http://schemas.openxmlformats.org/drawingml/2006/main" xmlns:r="http://schemas.openxmlformats.org/officeDocument/2006/relationships" xmlns:p="http://schemas.openxmlformats.org/presentationml/2006/main">
+  <p:cSld>
+    <p:spTree>
+      <p:nvGrpSpPr>
+        <p:cNvPr id="1" name=""/>
+        <p:cNvGrpSpPr/>
+        <p:nvPr/>
+      </p:nvGrpSpPr>
+      <p:grpSpPr>
+        <a:xfrm>
+          <a:off x="0" y="0"/>
+          <a:ext cx="0" cy="0"/>
+          <a:chOff x="0" y="0"/>
+          <a:chExt cx="0" cy="0"/>
+        </a:xfrm>
+      </p:grpSpPr>
+      <p:sp>
+        <p:nvSpPr>
+          <p:cNvPr id="2" name="Título 1">
+            <a:extLst>
+              <a:ext uri="{FF2B5EF4-FFF2-40B4-BE49-F238E27FC236}">
+                <a16:creationId xmlns:a16="http://schemas.microsoft.com/office/drawing/2014/main" id="{039A9E4D-7889-3490-92D8-D7D1CB98F7F3}"/>
+              </a:ext>
+            </a:extLst>
+          </p:cNvPr>
+          <p:cNvSpPr>
+            <a:spLocks noGrp="1"/>
+          </p:cNvSpPr>
+          <p:nvPr>
+            <p:ph type="title"/>
+          </p:nvPr>
+        </p:nvSpPr>
+        <p:spPr/>
+        <p:txBody>
+          <a:bodyPr/>
+          <a:lstStyle/>
+          <a:p>
+            <a:r>
+              <a:rPr lang="es-MX" dirty="0"/>
+              <a:t>General </a:t>
+            </a:r>
+            <a:r>
+              <a:rPr lang="es-MX" dirty="0" err="1"/>
+              <a:t>Concepts</a:t>
+            </a:r>
+            <a:endParaRPr lang="es-MX" dirty="0"/>
+          </a:p>
+        </p:txBody>
+      </p:sp>
+      <p:sp>
+        <p:nvSpPr>
+          <p:cNvPr id="3" name="Marcador de contenido 2">
+            <a:extLst>
+              <a:ext uri="{FF2B5EF4-FFF2-40B4-BE49-F238E27FC236}">
+                <a16:creationId xmlns:a16="http://schemas.microsoft.com/office/drawing/2014/main" id="{51C96787-3C54-0E42-4F41-C2125EE9B2F3}"/>
+              </a:ext>
+            </a:extLst>
+          </p:cNvPr>
+          <p:cNvSpPr>
+            <a:spLocks noGrp="1"/>
+          </p:cNvSpPr>
+          <p:nvPr>
+            <p:ph idx="1"/>
+          </p:nvPr>
+        </p:nvSpPr>
+        <p:spPr/>
+        <p:txBody>
+          <a:bodyPr>
+            <a:normAutofit fontScale="85000" lnSpcReduction="10000"/>
+          </a:bodyPr>
+          <a:lstStyle/>
+          <a:p>
+            <a:r>
+              <a:rPr lang="es-MX" b="1" dirty="0" err="1"/>
+              <a:t>Process</a:t>
+            </a:r>
+            <a:r>
+              <a:rPr lang="es-MX" dirty="0"/>
+              <a:t>: </a:t>
+            </a:r>
+            <a:r>
+              <a:rPr lang="en-US" dirty="0"/>
+              <a:t>The concept of a “process” existed within Windows-based operating systems well before the release of the .NET/.NET Core platforms. In simple terms, a process is a running program.</a:t>
+            </a:r>
+          </a:p>
+          <a:p>
+            <a:endParaRPr lang="es-MX" dirty="0"/>
+          </a:p>
+          <a:p>
+            <a:r>
+              <a:rPr lang="es-MX" b="1" dirty="0" err="1"/>
+              <a:t>Thread</a:t>
+            </a:r>
+            <a:r>
+              <a:rPr lang="es-MX" b="1" dirty="0"/>
+              <a:t>: </a:t>
+            </a:r>
+            <a:r>
+              <a:rPr lang="en-US" dirty="0"/>
+              <a:t>A thread is the smallest unit in an operating system, and it executes instructions in the processor. A process is a bigger executing container, and the thread inside the process is the smallest unit to use processor time and execute instructions.</a:t>
+            </a:r>
+            <a:r>
+              <a:rPr lang="en-US" b="1" dirty="0"/>
+              <a:t> </a:t>
+            </a:r>
+            <a:r>
+              <a:rPr lang="en-US" dirty="0"/>
+              <a:t>A thread is an execution path that can proceed independently of others. Each thread runs within an operating system process, which provides an isolated environment in which a program runs. </a:t>
+            </a:r>
+          </a:p>
+          <a:p>
+            <a:endParaRPr lang="en-US" dirty="0"/>
+          </a:p>
+          <a:p>
+            <a:r>
+              <a:rPr lang="en-US" b="1" dirty="0"/>
+              <a:t>Multithreading</a:t>
+            </a:r>
+            <a:r>
+              <a:rPr lang="en-US" dirty="0"/>
+              <a:t>: With a multithreaded program, multiple threads run in a single process, sharing the same execution environment (memory). Multithreaded processes provide the illusion that numerous activities are happening at the same time.</a:t>
+            </a:r>
+            <a:endParaRPr lang="es-MX" dirty="0"/>
+          </a:p>
+          <a:p>
+            <a:endParaRPr lang="es-MX" dirty="0"/>
+          </a:p>
+          <a:p>
+            <a:endParaRPr lang="es-MX" dirty="0"/>
+          </a:p>
+          <a:p>
+            <a:pPr marL="0" indent="0">
+              <a:buNone/>
+            </a:pPr>
+            <a:endParaRPr lang="es-MX" dirty="0"/>
+          </a:p>
+        </p:txBody>
+      </p:sp>
+    </p:spTree>
+    <p:extLst>
+      <p:ext uri="{BB962C8B-B14F-4D97-AF65-F5344CB8AC3E}">
+        <p14:creationId xmlns:p14="http://schemas.microsoft.com/office/powerpoint/2010/main" val="950616302"/>
+      </p:ext>
+    </p:extLst>
+  </p:cSld>
+  <p:clrMapOvr>
+    <a:masterClrMapping/>
+  </p:clrMapOvr>
+</p:sld>
+</file>
+
+<file path=ppt/slides/slide5.xml><?xml version="1.0" encoding="utf-8"?>
+<p:sld xmlns:a="http://schemas.openxmlformats.org/drawingml/2006/main" xmlns:r="http://schemas.openxmlformats.org/officeDocument/2006/relationships" xmlns:p="http://schemas.openxmlformats.org/presentationml/2006/main">
+  <p:cSld>
+    <p:spTree>
+      <p:nvGrpSpPr>
+        <p:cNvPr id="1" name=""/>
+        <p:cNvGrpSpPr/>
+        <p:nvPr/>
+      </p:nvGrpSpPr>
+      <p:grpSpPr>
+        <a:xfrm>
+          <a:off x="0" y="0"/>
+          <a:ext cx="0" cy="0"/>
+          <a:chOff x="0" y="0"/>
+          <a:chExt cx="0" cy="0"/>
+        </a:xfrm>
+      </p:grpSpPr>
+      <p:sp>
+        <p:nvSpPr>
+          <p:cNvPr id="2" name="Título 1">
+            <a:extLst>
+              <a:ext uri="{FF2B5EF4-FFF2-40B4-BE49-F238E27FC236}">
+                <a16:creationId xmlns:a16="http://schemas.microsoft.com/office/drawing/2014/main" id="{039A9E4D-7889-3490-92D8-D7D1CB98F7F3}"/>
+              </a:ext>
+            </a:extLst>
+          </p:cNvPr>
+          <p:cNvSpPr>
+            <a:spLocks noGrp="1"/>
+          </p:cNvSpPr>
+          <p:nvPr>
+            <p:ph type="title"/>
+          </p:nvPr>
+        </p:nvSpPr>
+        <p:spPr/>
+        <p:txBody>
+          <a:bodyPr/>
+          <a:lstStyle/>
+          <a:p>
+            <a:r>
+              <a:rPr lang="es-MX" dirty="0"/>
+              <a:t>General </a:t>
+            </a:r>
+            <a:r>
+              <a:rPr lang="es-MX" dirty="0" err="1"/>
+              <a:t>Concepts</a:t>
+            </a:r>
+            <a:endParaRPr lang="es-MX" dirty="0"/>
+          </a:p>
+        </p:txBody>
+      </p:sp>
+      <p:sp>
+        <p:nvSpPr>
+          <p:cNvPr id="3" name="Marcador de contenido 2">
+            <a:extLst>
+              <a:ext uri="{FF2B5EF4-FFF2-40B4-BE49-F238E27FC236}">
+                <a16:creationId xmlns:a16="http://schemas.microsoft.com/office/drawing/2014/main" id="{51C96787-3C54-0E42-4F41-C2125EE9B2F3}"/>
+              </a:ext>
+            </a:extLst>
+          </p:cNvPr>
+          <p:cNvSpPr>
+            <a:spLocks noGrp="1"/>
+          </p:cNvSpPr>
+          <p:nvPr>
+            <p:ph idx="1"/>
+          </p:nvPr>
+        </p:nvSpPr>
+        <p:spPr/>
+        <p:txBody>
+          <a:bodyPr>
+            <a:normAutofit fontScale="92500" lnSpcReduction="20000"/>
+          </a:bodyPr>
+          <a:lstStyle/>
+          <a:p>
+            <a:r>
+              <a:rPr lang="es-MX" b="1" dirty="0" err="1"/>
+              <a:t>Asynchronous</a:t>
+            </a:r>
+            <a:r>
+              <a:rPr lang="es-MX" dirty="0"/>
+              <a:t>:  </a:t>
+            </a:r>
+            <a:r>
+              <a:rPr lang="en-US" dirty="0"/>
+              <a:t>The idea behind asynchronous programming is that none of the threads should be waiting on an operation – that is, the framework should have the capability to wrap an operation into some abstraction and then resume once the operation is completed without blocking any threads. </a:t>
+            </a:r>
+          </a:p>
+          <a:p>
+            <a:endParaRPr lang="en-US" dirty="0"/>
+          </a:p>
+          <a:p>
+            <a:r>
+              <a:rPr lang="es-MX" b="1" dirty="0" err="1"/>
+              <a:t>Task</a:t>
+            </a:r>
+            <a:r>
+              <a:rPr lang="es-MX" dirty="0"/>
+              <a:t>: </a:t>
+            </a:r>
+            <a:r>
+              <a:rPr lang="es-MX" dirty="0" err="1"/>
+              <a:t>Is</a:t>
+            </a:r>
+            <a:r>
+              <a:rPr lang="es-MX" dirty="0"/>
+              <a:t> the </a:t>
+            </a:r>
+            <a:r>
+              <a:rPr lang="es-MX" dirty="0" err="1"/>
+              <a:t>abstraction</a:t>
+            </a:r>
+            <a:r>
+              <a:rPr lang="es-MX" dirty="0"/>
+              <a:t> </a:t>
+            </a:r>
+            <a:r>
+              <a:rPr lang="es-MX" dirty="0" err="1"/>
+              <a:t>mentioned</a:t>
+            </a:r>
+            <a:r>
+              <a:rPr lang="es-MX" dirty="0"/>
+              <a:t> </a:t>
+            </a:r>
+            <a:r>
+              <a:rPr lang="es-MX" dirty="0" err="1"/>
+              <a:t>before</a:t>
+            </a:r>
+            <a:r>
+              <a:rPr lang="es-MX" dirty="0"/>
+              <a:t>. </a:t>
+            </a:r>
+            <a:r>
+              <a:rPr lang="en-US" dirty="0"/>
+              <a:t>The Task class simplifies wrapping any wait operation, whether it is data retrieved from a database, a file being loaded into memory from disk, or any highly CPU-intensive operation, and simplifies running it on a separate thread if it is needed.</a:t>
+            </a:r>
+          </a:p>
+          <a:p>
+            <a:endParaRPr lang="es-MX" dirty="0"/>
+          </a:p>
+          <a:p>
+            <a:r>
+              <a:rPr lang="es-MX" b="1" dirty="0" err="1"/>
+              <a:t>Parallel</a:t>
+            </a:r>
+            <a:r>
+              <a:rPr lang="es-MX" dirty="0"/>
+              <a:t>: </a:t>
+            </a:r>
+            <a:r>
+              <a:rPr lang="en-US" dirty="0"/>
+              <a:t>Programming to leverage multicores or multiple processors is called parallel programming. is a subset of the broader concept of multithreading.</a:t>
+            </a:r>
+            <a:endParaRPr lang="es-MX" dirty="0"/>
+          </a:p>
+          <a:p>
+            <a:endParaRPr lang="es-MX" dirty="0"/>
+          </a:p>
+          <a:p>
+            <a:endParaRPr lang="es-MX" dirty="0"/>
+          </a:p>
+          <a:p>
+            <a:pPr marL="0" indent="0">
+              <a:buNone/>
+            </a:pPr>
+            <a:endParaRPr lang="es-MX" dirty="0"/>
+          </a:p>
+        </p:txBody>
+      </p:sp>
+    </p:spTree>
+    <p:extLst>
+      <p:ext uri="{BB962C8B-B14F-4D97-AF65-F5344CB8AC3E}">
+        <p14:creationId xmlns:p14="http://schemas.microsoft.com/office/powerpoint/2010/main" val="209537514"/>
+      </p:ext>
+    </p:extLst>
+  </p:cSld>
+  <p:clrMapOvr>
+    <a:masterClrMapping/>
+  </p:clrMapOvr>
+</p:sld>
+</file>
+
+<file path=ppt/slides/slide6.xml><?xml version="1.0" encoding="utf-8"?>
+<p:sld xmlns:a="http://schemas.openxmlformats.org/drawingml/2006/main" xmlns:r="http://schemas.openxmlformats.org/officeDocument/2006/relationships" xmlns:p="http://schemas.openxmlformats.org/presentationml/2006/main">
+  <p:cSld>
+    <p:spTree>
+      <p:nvGrpSpPr>
+        <p:cNvPr id="1" name=""/>
+        <p:cNvGrpSpPr/>
+        <p:nvPr/>
+      </p:nvGrpSpPr>
+      <p:grpSpPr>
+        <a:xfrm>
+          <a:off x="0" y="0"/>
+          <a:ext cx="0" cy="0"/>
+          <a:chOff x="0" y="0"/>
+          <a:chExt cx="0" cy="0"/>
+        </a:xfrm>
+      </p:grpSpPr>
+      <p:sp>
+        <p:nvSpPr>
+          <p:cNvPr id="2" name="Título 1">
+            <a:extLst>
+              <a:ext uri="{FF2B5EF4-FFF2-40B4-BE49-F238E27FC236}">
+                <a16:creationId xmlns:a16="http://schemas.microsoft.com/office/drawing/2014/main" id="{039A9E4D-7889-3490-92D8-D7D1CB98F7F3}"/>
+              </a:ext>
+            </a:extLst>
+          </p:cNvPr>
+          <p:cNvSpPr>
+            <a:spLocks noGrp="1"/>
+          </p:cNvSpPr>
+          <p:nvPr>
+            <p:ph type="title"/>
+          </p:nvPr>
+        </p:nvSpPr>
+        <p:spPr/>
+        <p:txBody>
+          <a:bodyPr/>
+          <a:lstStyle/>
+          <a:p>
+            <a:r>
+              <a:rPr lang="es-MX" dirty="0" err="1"/>
+              <a:t>Why</a:t>
+            </a:r>
+            <a:r>
+              <a:rPr lang="es-MX" dirty="0"/>
+              <a:t> </a:t>
+            </a:r>
+            <a:r>
+              <a:rPr lang="es-MX" dirty="0" err="1"/>
+              <a:t>multithread</a:t>
+            </a:r>
+            <a:r>
+              <a:rPr lang="es-MX" dirty="0"/>
+              <a:t>, multitask, </a:t>
+            </a:r>
+            <a:r>
+              <a:rPr lang="es-MX" dirty="0" err="1"/>
+              <a:t>async</a:t>
+            </a:r>
+            <a:r>
+              <a:rPr lang="es-MX" dirty="0"/>
+              <a:t> </a:t>
+            </a:r>
+            <a:r>
+              <a:rPr lang="es-MX" dirty="0" err="1"/>
+              <a:t>or</a:t>
+            </a:r>
+            <a:r>
+              <a:rPr lang="es-MX" dirty="0"/>
+              <a:t> </a:t>
+            </a:r>
+            <a:r>
+              <a:rPr lang="es-MX" dirty="0" err="1"/>
+              <a:t>parallel</a:t>
+            </a:r>
+            <a:r>
+              <a:rPr lang="es-MX" dirty="0"/>
+              <a:t>?</a:t>
+            </a:r>
+          </a:p>
+        </p:txBody>
+      </p:sp>
+      <p:sp>
+        <p:nvSpPr>
+          <p:cNvPr id="3" name="Marcador de contenido 2">
+            <a:extLst>
+              <a:ext uri="{FF2B5EF4-FFF2-40B4-BE49-F238E27FC236}">
+                <a16:creationId xmlns:a16="http://schemas.microsoft.com/office/drawing/2014/main" id="{51C96787-3C54-0E42-4F41-C2125EE9B2F3}"/>
+              </a:ext>
+            </a:extLst>
+          </p:cNvPr>
+          <p:cNvSpPr>
+            <a:spLocks noGrp="1"/>
+          </p:cNvSpPr>
+          <p:nvPr>
+            <p:ph idx="1"/>
+          </p:nvPr>
+        </p:nvSpPr>
+        <p:spPr/>
+        <p:txBody>
+          <a:bodyPr>
+            <a:normAutofit/>
+          </a:bodyPr>
+          <a:lstStyle/>
+          <a:p>
+            <a:r>
+              <a:rPr lang="en-US" b="1" dirty="0"/>
+              <a:t>To improve responsiveness: </a:t>
+            </a:r>
+            <a:r>
+              <a:rPr lang="en-US" dirty="0"/>
+              <a:t>A long-running operation might involve tasks that don’t require processor time. it doesn’t make sense to have a program burn CPU cycles waiting for the operation to complete when the program could be doing something more useful instead, such as responding to user input. </a:t>
+            </a:r>
+            <a:br>
+              <a:rPr lang="en-US" dirty="0"/>
+            </a:br>
+            <a:br>
+              <a:rPr lang="en-US" dirty="0"/>
+            </a:br>
+            <a:r>
+              <a:rPr lang="en-US" b="1" dirty="0"/>
+              <a:t>To improve scalability: </a:t>
+            </a:r>
+            <a:r>
+              <a:rPr lang="en-US" dirty="0"/>
+              <a:t>If an operation is CPU bound, you can improve scalability by making efficient use of available processing resources and using these resources to reduce the time required to execute the operation. A developer can determine which operations include tasks that can</a:t>
+            </a:r>
+            <a:endParaRPr lang="es-MX" dirty="0"/>
+          </a:p>
+          <a:p>
+            <a:endParaRPr lang="es-MX" dirty="0"/>
+          </a:p>
+          <a:p>
+            <a:pPr marL="0" indent="0">
+              <a:buNone/>
+            </a:pPr>
+            <a:endParaRPr lang="es-MX" dirty="0"/>
+          </a:p>
+        </p:txBody>
+      </p:sp>
+    </p:spTree>
+    <p:extLst>
+      <p:ext uri="{BB962C8B-B14F-4D97-AF65-F5344CB8AC3E}">
+        <p14:creationId xmlns:p14="http://schemas.microsoft.com/office/powerpoint/2010/main" val="1339158806"/>
+      </p:ext>
+    </p:extLst>
+  </p:cSld>
+  <p:clrMapOvr>
+    <a:masterClrMapping/>
+  </p:clrMapOvr>
+</p:sld>
+</file>
+
+<file path=ppt/slides/slide7.xml><?xml version="1.0" encoding="utf-8"?>
+<p:sld xmlns:a="http://schemas.openxmlformats.org/drawingml/2006/main" xmlns:r="http://schemas.openxmlformats.org/officeDocument/2006/relationships" xmlns:p="http://schemas.openxmlformats.org/presentationml/2006/main">
+  <p:cSld>
+    <p:spTree>
+      <p:nvGrpSpPr>
+        <p:cNvPr id="1" name=""/>
+        <p:cNvGrpSpPr/>
+        <p:nvPr/>
+      </p:nvGrpSpPr>
+      <p:grpSpPr>
+        <a:xfrm>
+          <a:off x="0" y="0"/>
+          <a:ext cx="0" cy="0"/>
+          <a:chOff x="0" y="0"/>
+          <a:chExt cx="0" cy="0"/>
+        </a:xfrm>
+      </p:grpSpPr>
+      <p:sp>
+        <p:nvSpPr>
+          <p:cNvPr id="2" name="Título 1">
+            <a:extLst>
+              <a:ext uri="{FF2B5EF4-FFF2-40B4-BE49-F238E27FC236}">
+                <a16:creationId xmlns:a16="http://schemas.microsoft.com/office/drawing/2014/main" id="{039A9E4D-7889-3490-92D8-D7D1CB98F7F3}"/>
+              </a:ext>
+            </a:extLst>
+          </p:cNvPr>
+          <p:cNvSpPr>
+            <a:spLocks noGrp="1"/>
+          </p:cNvSpPr>
+          <p:nvPr>
+            <p:ph type="title"/>
+          </p:nvPr>
+        </p:nvSpPr>
+        <p:spPr/>
+        <p:txBody>
+          <a:bodyPr/>
+          <a:lstStyle/>
+          <a:p>
+            <a:r>
+              <a:rPr lang="es-MX" dirty="0"/>
+              <a:t>C# </a:t>
+            </a:r>
+            <a:r>
+              <a:rPr lang="es-MX" dirty="0" err="1"/>
+              <a:t>Implementation</a:t>
+            </a:r>
+            <a:r>
+              <a:rPr lang="es-MX" dirty="0"/>
+              <a:t> </a:t>
+            </a:r>
+            <a:r>
+              <a:rPr lang="es-MX" dirty="0" err="1"/>
+              <a:t>Options</a:t>
+            </a:r>
+            <a:endParaRPr lang="es-MX" dirty="0"/>
+          </a:p>
+        </p:txBody>
+      </p:sp>
+      <p:sp>
+        <p:nvSpPr>
+          <p:cNvPr id="3" name="Marcador de contenido 2">
+            <a:extLst>
+              <a:ext uri="{FF2B5EF4-FFF2-40B4-BE49-F238E27FC236}">
+                <a16:creationId xmlns:a16="http://schemas.microsoft.com/office/drawing/2014/main" id="{51C96787-3C54-0E42-4F41-C2125EE9B2F3}"/>
+              </a:ext>
+            </a:extLst>
+          </p:cNvPr>
+          <p:cNvSpPr>
+            <a:spLocks noGrp="1"/>
+          </p:cNvSpPr>
+          <p:nvPr>
+            <p:ph idx="1"/>
+          </p:nvPr>
+        </p:nvSpPr>
+        <p:spPr/>
+        <p:txBody>
+          <a:bodyPr/>
+          <a:lstStyle/>
+          <a:p>
+            <a:r>
+              <a:rPr lang="es-MX" dirty="0" err="1"/>
+              <a:t>Thread</a:t>
+            </a:r>
+            <a:r>
+              <a:rPr lang="es-MX" dirty="0"/>
+              <a:t>, </a:t>
+            </a:r>
+            <a:r>
+              <a:rPr lang="es-MX" dirty="0" err="1"/>
+              <a:t>ThreadPool</a:t>
+            </a:r>
+            <a:endParaRPr lang="es-MX" dirty="0"/>
+          </a:p>
+          <a:p>
+            <a:r>
+              <a:rPr lang="es-MX" dirty="0" err="1"/>
+              <a:t>Dispatcher</a:t>
+            </a:r>
+            <a:r>
+              <a:rPr lang="es-MX" dirty="0"/>
+              <a:t>, </a:t>
+            </a:r>
+            <a:r>
+              <a:rPr lang="es-MX" dirty="0" err="1"/>
+              <a:t>Backgroundworker</a:t>
+            </a:r>
+            <a:endParaRPr lang="es-MX" dirty="0"/>
+          </a:p>
+          <a:p>
+            <a:r>
+              <a:rPr lang="es-MX" dirty="0" err="1"/>
+              <a:t>Task</a:t>
+            </a:r>
+            <a:r>
+              <a:rPr lang="es-MX" dirty="0"/>
+              <a:t> (TPL)</a:t>
+            </a:r>
+          </a:p>
+          <a:p>
+            <a:r>
+              <a:rPr lang="es-MX" dirty="0" err="1"/>
+              <a:t>Async</a:t>
+            </a:r>
+            <a:r>
+              <a:rPr lang="es-MX" dirty="0"/>
+              <a:t> </a:t>
+            </a:r>
+            <a:r>
+              <a:rPr lang="es-MX" dirty="0" err="1"/>
+              <a:t>await</a:t>
+            </a:r>
+            <a:endParaRPr lang="es-MX" dirty="0"/>
+          </a:p>
+          <a:p>
+            <a:r>
+              <a:rPr lang="es-MX" dirty="0"/>
+              <a:t>PFX, PLINQ</a:t>
+            </a:r>
+          </a:p>
+          <a:p>
+            <a:endParaRPr lang="es-MX" dirty="0"/>
+          </a:p>
+          <a:p>
+            <a:endParaRPr lang="es-MX" dirty="0"/>
+          </a:p>
+          <a:p>
+            <a:endParaRPr lang="es-MX" dirty="0"/>
+          </a:p>
+          <a:p>
+            <a:pPr marL="0" indent="0">
+              <a:buNone/>
+            </a:pPr>
+            <a:endParaRPr lang="es-MX" dirty="0"/>
+          </a:p>
+        </p:txBody>
+      </p:sp>
+    </p:spTree>
+    <p:extLst>
+      <p:ext uri="{BB962C8B-B14F-4D97-AF65-F5344CB8AC3E}">
+        <p14:creationId xmlns:p14="http://schemas.microsoft.com/office/powerpoint/2010/main" val="3508183269"/>
+      </p:ext>
+    </p:extLst>
+  </p:cSld>
+  <p:clrMapOvr>
+    <a:masterClrMapping/>
+  </p:clrMapOvr>
+</p:sld>
+</file>
+
+<file path=ppt/slides/slide8.xml><?xml version="1.0" encoding="utf-8"?>
+<p:sld xmlns:a="http://schemas.openxmlformats.org/drawingml/2006/main" xmlns:r="http://schemas.openxmlformats.org/officeDocument/2006/relationships" xmlns:p="http://schemas.openxmlformats.org/presentationml/2006/main">
+  <p:cSld>
+    <p:spTree>
+      <p:nvGrpSpPr>
+        <p:cNvPr id="1" name=""/>
+        <p:cNvGrpSpPr/>
+        <p:nvPr/>
+      </p:nvGrpSpPr>
+      <p:grpSpPr>
+        <a:xfrm>
+          <a:off x="0" y="0"/>
+          <a:ext cx="0" cy="0"/>
+          <a:chOff x="0" y="0"/>
+          <a:chExt cx="0" cy="0"/>
+        </a:xfrm>
+      </p:grpSpPr>
+      <p:sp>
+        <p:nvSpPr>
+          <p:cNvPr id="2" name="Título 1">
+            <a:extLst>
+              <a:ext uri="{FF2B5EF4-FFF2-40B4-BE49-F238E27FC236}">
+                <a16:creationId xmlns:a16="http://schemas.microsoft.com/office/drawing/2014/main" id="{422D584E-DFA6-504A-DF09-FB6C1BED9CDB}"/>
+              </a:ext>
+            </a:extLst>
+          </p:cNvPr>
+          <p:cNvSpPr>
+            <a:spLocks noGrp="1"/>
+          </p:cNvSpPr>
+          <p:nvPr>
+            <p:ph type="ctrTitle"/>
+          </p:nvPr>
+        </p:nvSpPr>
+        <p:spPr/>
+        <p:txBody>
+          <a:bodyPr/>
+          <a:lstStyle/>
+          <a:p>
+            <a:r>
+              <a:rPr lang="es-MX" dirty="0" err="1"/>
+              <a:t>Code</a:t>
+            </a:r>
+            <a:r>
+              <a:rPr lang="es-MX" dirty="0"/>
+              <a:t> Time  </a:t>
+            </a:r>
+            <a:r>
+              <a:rPr lang="es-MX" dirty="0">
+                <a:sym typeface="Wingdings" panose="05000000000000000000" pitchFamily="2" charset="2"/>
+              </a:rPr>
+              <a:t></a:t>
+            </a:r>
+            <a:r>
+              <a:rPr lang="es-MX" dirty="0"/>
+              <a:t> </a:t>
+            </a:r>
+          </a:p>
+        </p:txBody>
+      </p:sp>
+      <p:sp>
+        <p:nvSpPr>
+          <p:cNvPr id="3" name="Subtítulo 2">
+            <a:extLst>
+              <a:ext uri="{FF2B5EF4-FFF2-40B4-BE49-F238E27FC236}">
+                <a16:creationId xmlns:a16="http://schemas.microsoft.com/office/drawing/2014/main" id="{27B5A0C9-730A-34D7-9FB5-BFF412D917CE}"/>
+              </a:ext>
+            </a:extLst>
+          </p:cNvPr>
+          <p:cNvSpPr>
+            <a:spLocks noGrp="1"/>
+          </p:cNvSpPr>
+          <p:nvPr>
+            <p:ph type="subTitle" idx="1"/>
+          </p:nvPr>
+        </p:nvSpPr>
+        <p:spPr/>
+        <p:txBody>
+          <a:bodyPr/>
+          <a:lstStyle/>
+          <a:p>
+            <a:endParaRPr lang="es-MX" dirty="0"/>
+          </a:p>
+        </p:txBody>
+      </p:sp>
+    </p:spTree>
+    <p:extLst>
+      <p:ext uri="{BB962C8B-B14F-4D97-AF65-F5344CB8AC3E}">
+        <p14:creationId xmlns:p14="http://schemas.microsoft.com/office/powerpoint/2010/main" val="3142671275"/>
+      </p:ext>
+    </p:extLst>
+  </p:cSld>
+  <p:clrMapOvr>
+    <a:masterClrMapping/>
+  </p:clrMapOvr>
+</p:sld>
+</file>
+
+<file path=ppt/slides/slide9.xml><?xml version="1.0" encoding="utf-8"?>
+<p:sld xmlns:a="http://schemas.openxmlformats.org/drawingml/2006/main" xmlns:r="http://schemas.openxmlformats.org/officeDocument/2006/relationships" xmlns:p="http://schemas.openxmlformats.org/presentationml/2006/main">
+  <p:cSld>
+    <p:spTree>
+      <p:nvGrpSpPr>
+        <p:cNvPr id="1" name=""/>
+        <p:cNvGrpSpPr/>
+        <p:nvPr/>
+      </p:nvGrpSpPr>
+      <p:grpSpPr>
+        <a:xfrm>
+          <a:off x="0" y="0"/>
+          <a:ext cx="0" cy="0"/>
+          <a:chOff x="0" y="0"/>
+          <a:chExt cx="0" cy="0"/>
+        </a:xfrm>
+      </p:grpSpPr>
+      <p:sp>
+        <p:nvSpPr>
+          <p:cNvPr id="2" name="Título 1">
+            <a:extLst>
+              <a:ext uri="{FF2B5EF4-FFF2-40B4-BE49-F238E27FC236}">
+                <a16:creationId xmlns:a16="http://schemas.microsoft.com/office/drawing/2014/main" id="{0DBB358B-D5D7-265B-B2C3-1F0E207DD9D0}"/>
+              </a:ext>
+            </a:extLst>
+          </p:cNvPr>
+          <p:cNvSpPr>
+            <a:spLocks noGrp="1"/>
+          </p:cNvSpPr>
+          <p:nvPr>
+            <p:ph type="title"/>
+          </p:nvPr>
+        </p:nvSpPr>
+        <p:spPr/>
+        <p:txBody>
+          <a:bodyPr/>
+          <a:lstStyle/>
+          <a:p>
+            <a:r>
+              <a:rPr lang="es-MX" dirty="0" err="1"/>
+              <a:t>Resources</a:t>
+            </a:r>
+            <a:endParaRPr lang="es-MX" dirty="0"/>
+          </a:p>
+        </p:txBody>
+      </p:sp>
+      <p:sp>
+        <p:nvSpPr>
+          <p:cNvPr id="3" name="Marcador de contenido 2">
+            <a:extLst>
+              <a:ext uri="{FF2B5EF4-FFF2-40B4-BE49-F238E27FC236}">
+                <a16:creationId xmlns:a16="http://schemas.microsoft.com/office/drawing/2014/main" id="{3C3A0479-B472-51E7-D1B5-D22B83113ACC}"/>
+              </a:ext>
+            </a:extLst>
+          </p:cNvPr>
+          <p:cNvSpPr>
+            <a:spLocks noGrp="1"/>
+          </p:cNvSpPr>
+          <p:nvPr>
+            <p:ph idx="1"/>
+          </p:nvPr>
+        </p:nvSpPr>
+        <p:spPr>
+          <a:xfrm>
+            <a:off x="1103312" y="1587253"/>
+            <a:ext cx="9541684" cy="5201728"/>
+          </a:xfrm>
+        </p:spPr>
+        <p:txBody>
+          <a:bodyPr>
+            <a:normAutofit fontScale="70000" lnSpcReduction="20000"/>
+          </a:bodyPr>
+          <a:lstStyle/>
+          <a:p>
+            <a:r>
+              <a:rPr lang="es-MX" sz="2600" dirty="0">
+                <a:hlinkClick r:id="rId2"/>
+              </a:rPr>
+              <a:t>https://docs.microsoft.com/en-us/dotnet/standard/parallel-programming/</a:t>
+            </a:r>
+            <a:endParaRPr lang="es-MX" sz="2600" dirty="0"/>
+          </a:p>
+          <a:p>
+            <a:r>
+              <a:rPr lang="es-MX" sz="2600" dirty="0" err="1"/>
+              <a:t>Akella</a:t>
+            </a:r>
+            <a:r>
+              <a:rPr lang="es-MX" sz="2600" dirty="0"/>
+              <a:t>, R et al (2022). </a:t>
+            </a:r>
+            <a:r>
+              <a:rPr lang="en-US" sz="2600" dirty="0"/>
+              <a:t>Enterprise Application Development with</a:t>
+            </a:r>
+            <a:br>
+              <a:rPr lang="en-US" sz="2600" dirty="0"/>
+            </a:br>
+            <a:r>
+              <a:rPr lang="en-US" sz="2600" dirty="0"/>
+              <a:t>C# 10 and .NET 6. Chapter 4 </a:t>
+            </a:r>
+            <a:r>
+              <a:rPr lang="es-MX" sz="2600" dirty="0" err="1"/>
+              <a:t>Threading</a:t>
+            </a:r>
+            <a:r>
+              <a:rPr lang="es-MX" sz="2600" dirty="0"/>
+              <a:t> and </a:t>
+            </a:r>
+            <a:r>
+              <a:rPr lang="es-MX" sz="2600" dirty="0" err="1"/>
+              <a:t>Asynchronous</a:t>
+            </a:r>
+            <a:br>
+              <a:rPr lang="es-MX" sz="2600" dirty="0"/>
+            </a:br>
+            <a:r>
+              <a:rPr lang="es-MX" sz="2600" dirty="0" err="1"/>
+              <a:t>Operations</a:t>
+            </a:r>
+            <a:r>
+              <a:rPr lang="es-MX" sz="2600" dirty="0"/>
+              <a:t>. </a:t>
+            </a:r>
+            <a:r>
+              <a:rPr lang="en-US" sz="2600" dirty="0" err="1"/>
+              <a:t>Packt</a:t>
+            </a:r>
+            <a:r>
+              <a:rPr lang="en-US" sz="2600" dirty="0"/>
+              <a:t> Publishing</a:t>
+            </a:r>
+          </a:p>
+          <a:p>
+            <a:r>
+              <a:rPr lang="en-US" sz="2600" dirty="0"/>
+              <a:t>Griffiths, I (2022). Programming C# 10 Build Cloud, Web, and Desktop Applications.</a:t>
+            </a:r>
+            <a:r>
+              <a:rPr lang="es-MX" sz="2600" b="1" i="0" dirty="0">
+                <a:solidFill>
+                  <a:srgbClr val="000000"/>
+                </a:solidFill>
+                <a:effectLst/>
+                <a:latin typeface="Arial-BoldMT"/>
+              </a:rPr>
+              <a:t> </a:t>
+            </a:r>
+            <a:r>
+              <a:rPr lang="es-MX" sz="2600" dirty="0" err="1"/>
+              <a:t>Chapter</a:t>
+            </a:r>
+            <a:r>
+              <a:rPr lang="es-MX" sz="2600" dirty="0"/>
+              <a:t> 16 </a:t>
+            </a:r>
+            <a:r>
+              <a:rPr lang="es-MX" sz="2600" dirty="0" err="1"/>
+              <a:t>Multithreading</a:t>
+            </a:r>
+            <a:r>
+              <a:rPr lang="es-MX" sz="2600" dirty="0"/>
+              <a:t>. </a:t>
+            </a:r>
+            <a:r>
+              <a:rPr lang="en-US" sz="2600" dirty="0" err="1"/>
+              <a:t>O’reilly</a:t>
+            </a:r>
+            <a:r>
+              <a:rPr lang="en-US" sz="2600" dirty="0"/>
+              <a:t> Media</a:t>
+            </a:r>
+          </a:p>
+          <a:p>
+            <a:r>
+              <a:rPr lang="en-US" sz="2600" dirty="0" err="1"/>
+              <a:t>Albahari</a:t>
+            </a:r>
+            <a:r>
+              <a:rPr lang="en-US" sz="2600" dirty="0"/>
+              <a:t>, J (2022). C# 10 in a Nutshell. Chapter 14. Concurrency and</a:t>
+            </a:r>
+            <a:br>
+              <a:rPr lang="en-US" sz="2600" dirty="0"/>
+            </a:br>
+            <a:r>
+              <a:rPr lang="en-US" sz="2600" dirty="0"/>
+              <a:t>Asynchrony. O’Reilly Media.</a:t>
+            </a:r>
+          </a:p>
+          <a:p>
+            <a:r>
+              <a:rPr lang="en-US" sz="2600" dirty="0"/>
+              <a:t>Price, M (2022). C# 10 and .NET 6 – Modern Cross-Platform Development. Chapter 12 Improving Performance and Scalability Using Multitasking. </a:t>
+            </a:r>
+            <a:r>
+              <a:rPr lang="en-US" sz="2600" dirty="0" err="1"/>
+              <a:t>Packt</a:t>
+            </a:r>
+            <a:r>
+              <a:rPr lang="en-US" sz="2600" dirty="0"/>
+              <a:t> Publishing</a:t>
+            </a:r>
+          </a:p>
+          <a:p>
+            <a:r>
+              <a:rPr lang="en-US" sz="2600" dirty="0"/>
+              <a:t>Sharp, J (2022). Microsoft Visual C# Step by Step. Chapter 24 Improving Performance and</a:t>
+            </a:r>
+            <a:br>
+              <a:rPr lang="en-US" sz="2600" dirty="0"/>
+            </a:br>
+            <a:r>
+              <a:rPr lang="en-US" sz="2600" dirty="0"/>
+              <a:t>Scalability Using Multitasking. Microsoft-Pearson Education. </a:t>
+            </a:r>
+            <a:br>
+              <a:rPr lang="en-US" sz="2100" dirty="0"/>
+            </a:br>
+            <a:r>
+              <a:rPr lang="en-US" sz="2100" dirty="0"/>
+              <a:t> </a:t>
+            </a:r>
+            <a:br>
+              <a:rPr lang="en-US" sz="2000" dirty="0"/>
+            </a:br>
+            <a:r>
+              <a:rPr lang="en-US" sz="2100" dirty="0"/>
+              <a:t> </a:t>
+            </a:r>
+            <a:br>
+              <a:rPr lang="en-US" dirty="0"/>
+            </a:br>
+            <a:br>
+              <a:rPr lang="en-US" dirty="0"/>
+            </a:br>
+            <a:br>
+              <a:rPr lang="en-US" dirty="0"/>
+            </a:br>
+            <a:br>
+              <a:rPr lang="en-US" dirty="0"/>
+            </a:br>
+            <a:br>
+              <a:rPr lang="en-US" dirty="0"/>
+            </a:br>
+            <a:endParaRPr lang="es-MX" dirty="0"/>
+          </a:p>
+        </p:txBody>
+      </p:sp>
+    </p:spTree>
+    <p:extLst>
+      <p:ext uri="{BB962C8B-B14F-4D97-AF65-F5344CB8AC3E}">
+        <p14:creationId xmlns:p14="http://schemas.microsoft.com/office/powerpoint/2010/main" val="1258878262"/>
       </p:ext>
     </p:extLst>
   </p:cSld>
@@ -9448,6 +9712,24 @@
 </file>
 
 <file path=customXml/item1.xml><?xml version="1.0" encoding="utf-8"?>
+<?mso-contentType ?>
+<FormTemplates xmlns="http://schemas.microsoft.com/sharepoint/v3/contenttype/forms">
+  <Display>DocumentLibraryForm</Display>
+  <Edit>DocumentLibraryForm</Edit>
+  <New>DocumentLibraryForm</New>
+</FormTemplates>
+</file>
+
+<file path=customXml/item2.xml><?xml version="1.0" encoding="utf-8"?>
+<p:properties xmlns:p="http://schemas.microsoft.com/office/2006/metadata/properties" xmlns:xsi="http://www.w3.org/2001/XMLSchema-instance" xmlns:pc="http://schemas.microsoft.com/office/infopath/2007/PartnerControls">
+  <documentManagement>
+    <Status xmlns="71af3243-3dd4-4a8d-8c0d-dd76da1f02a5">Not started</Status>
+    <MediaServiceKeyPoints xmlns="71af3243-3dd4-4a8d-8c0d-dd76da1f02a5" xsi:nil="true"/>
+  </documentManagement>
+</p:properties>
+</file>
+
+<file path=customXml/item3.xml><?xml version="1.0" encoding="utf-8"?>
 <ct:contentTypeSchema xmlns:ct="http://schemas.microsoft.com/office/2006/metadata/contentType" xmlns:ma="http://schemas.microsoft.com/office/2006/metadata/properties/metaAttributes" ct:_="" ma:_="" ma:contentTypeName="Document" ma:contentTypeID="0x01010079F111ED35F8CC479449609E8A0923A6" ma:contentTypeVersion="12" ma:contentTypeDescription="Create a new document." ma:contentTypeScope="" ma:versionID="93813dd7ca6ad654711aa0ab317e03a3">
   <xsd:schema xmlns:xsd="http://www.w3.org/2001/XMLSchema" xmlns:xs="http://www.w3.org/2001/XMLSchema" xmlns:p="http://schemas.microsoft.com/office/2006/metadata/properties" xmlns:ns2="71af3243-3dd4-4a8d-8c0d-dd76da1f02a5" xmlns:ns3="16c05727-aa75-4e4a-9b5f-8a80a1165891" targetNamespace="http://schemas.microsoft.com/office/2006/metadata/properties" ma:root="true" ma:fieldsID="f11dc0ce689dd3925e84e4e35398c6e7" ns2:_="" ns3:_="">
     <xsd:import namespace="71af3243-3dd4-4a8d-8c0d-dd76da1f02a5"/>
@@ -9668,25 +9950,25 @@
 </ct:contentTypeSchema>
 </file>
 
-<file path=customXml/item2.xml><?xml version="1.0" encoding="utf-8"?>
-<p:properties xmlns:p="http://schemas.microsoft.com/office/2006/metadata/properties" xmlns:xsi="http://www.w3.org/2001/XMLSchema-instance" xmlns:pc="http://schemas.microsoft.com/office/infopath/2007/PartnerControls">
-  <documentManagement>
-    <Status xmlns="71af3243-3dd4-4a8d-8c0d-dd76da1f02a5">Not started</Status>
-    <MediaServiceKeyPoints xmlns="71af3243-3dd4-4a8d-8c0d-dd76da1f02a5" xsi:nil="true"/>
-  </documentManagement>
-</p:properties>
+<file path=customXml/itemProps1.xml><?xml version="1.0" encoding="utf-8"?>
+<ds:datastoreItem xmlns:ds="http://schemas.openxmlformats.org/officeDocument/2006/customXml" ds:itemID="{0D16958A-754B-4396-9457-FD7A427A37DD}">
+  <ds:schemaRefs>
+    <ds:schemaRef ds:uri="http://schemas.microsoft.com/sharepoint/v3/contenttype/forms"/>
+  </ds:schemaRefs>
+</ds:datastoreItem>
 </file>
 
-<file path=customXml/item3.xml><?xml version="1.0" encoding="utf-8"?>
-<?mso-contentType ?>
-<FormTemplates xmlns="http://schemas.microsoft.com/sharepoint/v3/contenttype/forms">
-  <Display>DocumentLibraryForm</Display>
-  <Edit>DocumentLibraryForm</Edit>
-  <New>DocumentLibraryForm</New>
-</FormTemplates>
+<file path=customXml/itemProps2.xml><?xml version="1.0" encoding="utf-8"?>
+<ds:datastoreItem xmlns:ds="http://schemas.openxmlformats.org/officeDocument/2006/customXml" ds:itemID="{048C88F1-1664-415F-AFCE-F6CF45809817}">
+  <ds:schemaRefs>
+    <ds:schemaRef ds:uri="http://schemas.microsoft.com/office/2006/metadata/properties"/>
+    <ds:schemaRef ds:uri="http://schemas.microsoft.com/office/infopath/2007/PartnerControls"/>
+    <ds:schemaRef ds:uri="71af3243-3dd4-4a8d-8c0d-dd76da1f02a5"/>
+  </ds:schemaRefs>
+</ds:datastoreItem>
 </file>
 
-<file path=customXml/itemProps1.xml><?xml version="1.0" encoding="utf-8"?>
+<file path=customXml/itemProps3.xml><?xml version="1.0" encoding="utf-8"?>
 <ds:datastoreItem xmlns:ds="http://schemas.openxmlformats.org/officeDocument/2006/customXml" ds:itemID="{CC30393A-FEC6-4A44-9E4A-6EA49F1F7DC0}">
   <ds:schemaRefs>
     <ds:schemaRef ds:uri="http://schemas.microsoft.com/office/2006/metadata/contentType"/>
@@ -9703,22 +9985,4 @@
     <ds:schemaRef ds:uri="http://schemas.microsoft.com/internal/obd"/>
   </ds:schemaRefs>
 </ds:datastoreItem>
-</file>
-
-<file path=customXml/itemProps2.xml><?xml version="1.0" encoding="utf-8"?>
-<ds:datastoreItem xmlns:ds="http://schemas.openxmlformats.org/officeDocument/2006/customXml" ds:itemID="{048C88F1-1664-415F-AFCE-F6CF45809817}">
-  <ds:schemaRefs>
-    <ds:schemaRef ds:uri="http://schemas.microsoft.com/office/2006/metadata/properties"/>
-    <ds:schemaRef ds:uri="http://schemas.microsoft.com/office/infopath/2007/PartnerControls"/>
-    <ds:schemaRef ds:uri="71af3243-3dd4-4a8d-8c0d-dd76da1f02a5"/>
-  </ds:schemaRefs>
-</ds:datastoreItem>
-</file>
-
-<file path=customXml/itemProps3.xml><?xml version="1.0" encoding="utf-8"?>
-<ds:datastoreItem xmlns:ds="http://schemas.openxmlformats.org/officeDocument/2006/customXml" ds:itemID="{0D16958A-754B-4396-9457-FD7A427A37DD}">
-  <ds:schemaRefs>
-    <ds:schemaRef ds:uri="http://schemas.microsoft.com/sharepoint/v3/contenttype/forms"/>
-  </ds:schemaRefs>
-</ds:datastoreItem>
 </file>
</xml_diff>